<commit_message>
ignore; docker; begin 16
</commit_message>
<xml_diff>
--- a/Graphs.pptx
+++ b/Graphs.pptx
@@ -8,6 +8,9 @@
     <p:sldId id="256" r:id="rId2"/>
     <p:sldId id="257" r:id="rId3"/>
     <p:sldId id="258" r:id="rId4"/>
+    <p:sldId id="259" r:id="rId5"/>
+    <p:sldId id="260" r:id="rId6"/>
+    <p:sldId id="261" r:id="rId7"/>
   </p:sldIdLst>
   <p:sldSz cx="12192000" cy="6858000"/>
   <p:notesSz cx="6858000" cy="9144000"/>
@@ -106,6 +109,11 @@
       </a:defRPr>
     </a:lvl9pPr>
   </p:defaultTextStyle>
+  <p:extLst>
+    <p:ext uri="{EFAFB233-063F-42B5-8137-9DF3F51BA10A}">
+      <p15:sldGuideLst xmlns:p15="http://schemas.microsoft.com/office/powerpoint/2012/main"/>
+    </p:ext>
+  </p:extLst>
 </p:presentation>
 </file>
 
@@ -258,7 +266,7 @@
           <a:p>
             <a:fld id="{68A870FC-2C4C-D54B-8E22-26E581EF07E8}" type="datetimeFigureOut">
               <a:rPr lang="en-IL" smtClean="0"/>
-              <a:t>25/11/2022</a:t>
+              <a:t>05/02/2023</a:t>
             </a:fld>
             <a:endParaRPr lang="en-IL"/>
           </a:p>
@@ -458,7 +466,7 @@
           <a:p>
             <a:fld id="{68A870FC-2C4C-D54B-8E22-26E581EF07E8}" type="datetimeFigureOut">
               <a:rPr lang="en-IL" smtClean="0"/>
-              <a:t>25/11/2022</a:t>
+              <a:t>05/02/2023</a:t>
             </a:fld>
             <a:endParaRPr lang="en-IL"/>
           </a:p>
@@ -668,7 +676,7 @@
           <a:p>
             <a:fld id="{68A870FC-2C4C-D54B-8E22-26E581EF07E8}" type="datetimeFigureOut">
               <a:rPr lang="en-IL" smtClean="0"/>
-              <a:t>25/11/2022</a:t>
+              <a:t>05/02/2023</a:t>
             </a:fld>
             <a:endParaRPr lang="en-IL"/>
           </a:p>
@@ -868,7 +876,7 @@
           <a:p>
             <a:fld id="{68A870FC-2C4C-D54B-8E22-26E581EF07E8}" type="datetimeFigureOut">
               <a:rPr lang="en-IL" smtClean="0"/>
-              <a:t>25/11/2022</a:t>
+              <a:t>05/02/2023</a:t>
             </a:fld>
             <a:endParaRPr lang="en-IL"/>
           </a:p>
@@ -1144,7 +1152,7 @@
           <a:p>
             <a:fld id="{68A870FC-2C4C-D54B-8E22-26E581EF07E8}" type="datetimeFigureOut">
               <a:rPr lang="en-IL" smtClean="0"/>
-              <a:t>25/11/2022</a:t>
+              <a:t>05/02/2023</a:t>
             </a:fld>
             <a:endParaRPr lang="en-IL"/>
           </a:p>
@@ -1412,7 +1420,7 @@
           <a:p>
             <a:fld id="{68A870FC-2C4C-D54B-8E22-26E581EF07E8}" type="datetimeFigureOut">
               <a:rPr lang="en-IL" smtClean="0"/>
-              <a:t>25/11/2022</a:t>
+              <a:t>05/02/2023</a:t>
             </a:fld>
             <a:endParaRPr lang="en-IL"/>
           </a:p>
@@ -1827,7 +1835,7 @@
           <a:p>
             <a:fld id="{68A870FC-2C4C-D54B-8E22-26E581EF07E8}" type="datetimeFigureOut">
               <a:rPr lang="en-IL" smtClean="0"/>
-              <a:t>25/11/2022</a:t>
+              <a:t>05/02/2023</a:t>
             </a:fld>
             <a:endParaRPr lang="en-IL"/>
           </a:p>
@@ -1969,7 +1977,7 @@
           <a:p>
             <a:fld id="{68A870FC-2C4C-D54B-8E22-26E581EF07E8}" type="datetimeFigureOut">
               <a:rPr lang="en-IL" smtClean="0"/>
-              <a:t>25/11/2022</a:t>
+              <a:t>05/02/2023</a:t>
             </a:fld>
             <a:endParaRPr lang="en-IL"/>
           </a:p>
@@ -2082,7 +2090,7 @@
           <a:p>
             <a:fld id="{68A870FC-2C4C-D54B-8E22-26E581EF07E8}" type="datetimeFigureOut">
               <a:rPr lang="en-IL" smtClean="0"/>
-              <a:t>25/11/2022</a:t>
+              <a:t>05/02/2023</a:t>
             </a:fld>
             <a:endParaRPr lang="en-IL"/>
           </a:p>
@@ -2395,7 +2403,7 @@
           <a:p>
             <a:fld id="{68A870FC-2C4C-D54B-8E22-26E581EF07E8}" type="datetimeFigureOut">
               <a:rPr lang="en-IL" smtClean="0"/>
-              <a:t>25/11/2022</a:t>
+              <a:t>05/02/2023</a:t>
             </a:fld>
             <a:endParaRPr lang="en-IL"/>
           </a:p>
@@ -2684,7 +2692,7 @@
           <a:p>
             <a:fld id="{68A870FC-2C4C-D54B-8E22-26E581EF07E8}" type="datetimeFigureOut">
               <a:rPr lang="en-IL" smtClean="0"/>
-              <a:t>25/11/2022</a:t>
+              <a:t>05/02/2023</a:t>
             </a:fld>
             <a:endParaRPr lang="en-IL"/>
           </a:p>
@@ -2927,7 +2935,7 @@
           <a:p>
             <a:fld id="{68A870FC-2C4C-D54B-8E22-26E581EF07E8}" type="datetimeFigureOut">
               <a:rPr lang="en-IL" smtClean="0"/>
-              <a:t>25/11/2022</a:t>
+              <a:t>05/02/2023</a:t>
             </a:fld>
             <a:endParaRPr lang="en-IL"/>
           </a:p>
@@ -10157,8 +10165,8 @@
           <a:chExt cx="0" cy="0"/>
         </a:xfrm>
       </p:grpSpPr>
-      <mc:AlternateContent xmlns:mc="http://schemas.openxmlformats.org/markup-compatibility/2006">
-        <mc:Choice xmlns:a14="http://schemas.microsoft.com/office/drawing/2010/main" Requires="a14">
+      <mc:AlternateContent xmlns:mc="http://schemas.openxmlformats.org/markup-compatibility/2006" xmlns:a14="http://schemas.microsoft.com/office/drawing/2010/main">
+        <mc:Choice Requires="a14">
           <p:sp>
             <p:nvSpPr>
               <p:cNvPr id="8" name="TextBox 7">
@@ -10192,6 +10200,7 @@
               </a:bodyPr>
               <a:lstStyle/>
               <a:p>
+                <a:pPr/>
                 <a14:m>
                   <m:oMathPara xmlns:m="http://schemas.openxmlformats.org/officeDocument/2006/math">
                     <m:oMathParaPr>
@@ -10243,6 +10252,7 @@
                 </a:endParaRPr>
               </a:p>
               <a:p>
+                <a:pPr/>
                 <a14:m>
                   <m:oMathPara xmlns:m="http://schemas.openxmlformats.org/officeDocument/2006/math">
                     <m:oMathParaPr>
@@ -10273,6 +10283,7 @@
                 <a:endParaRPr lang="en-US" b="0" dirty="0"/>
               </a:p>
               <a:p>
+                <a:pPr/>
                 <a14:m>
                   <m:oMathPara xmlns:m="http://schemas.openxmlformats.org/officeDocument/2006/math">
                     <m:oMathParaPr>
@@ -10303,6 +10314,7 @@
                 <a:endParaRPr lang="en-US" b="0" dirty="0"/>
               </a:p>
               <a:p>
+                <a:pPr/>
                 <a14:m>
                   <m:oMathPara xmlns:m="http://schemas.openxmlformats.org/officeDocument/2006/math">
                     <m:oMathParaPr>
@@ -10333,6 +10345,7 @@
                 <a:endParaRPr lang="en-US" b="0" dirty="0"/>
               </a:p>
               <a:p>
+                <a:pPr/>
                 <a14:m>
                   <m:oMathPara xmlns:m="http://schemas.openxmlformats.org/officeDocument/2006/math">
                     <m:oMathParaPr>
@@ -10363,6 +10376,7 @@
                 <a:endParaRPr lang="en-US" b="0" dirty="0"/>
               </a:p>
               <a:p>
+                <a:pPr/>
                 <a14:m>
                   <m:oMathPara xmlns:m="http://schemas.openxmlformats.org/officeDocument/2006/math">
                     <m:oMathParaPr>
@@ -10395,7 +10409,7 @@
             </p:txBody>
           </p:sp>
         </mc:Choice>
-        <mc:Fallback>
+        <mc:Fallback xmlns="">
           <p:sp>
             <p:nvSpPr>
               <p:cNvPr id="8" name="TextBox 7">
@@ -10445,8 +10459,8 @@
           </p:sp>
         </mc:Fallback>
       </mc:AlternateContent>
-      <mc:AlternateContent xmlns:mc="http://schemas.openxmlformats.org/markup-compatibility/2006">
-        <mc:Choice xmlns:a14="http://schemas.microsoft.com/office/drawing/2010/main" Requires="a14">
+      <mc:AlternateContent xmlns:mc="http://schemas.openxmlformats.org/markup-compatibility/2006" xmlns:a14="http://schemas.microsoft.com/office/drawing/2010/main">
+        <mc:Choice Requires="a14">
           <p:sp>
             <p:nvSpPr>
               <p:cNvPr id="9" name="TextBox 8">
@@ -10480,6 +10494,7 @@
               </a:bodyPr>
               <a:lstStyle/>
               <a:p>
+                <a:pPr/>
                 <a14:m>
                   <m:oMathPara xmlns:m="http://schemas.openxmlformats.org/officeDocument/2006/math">
                     <m:oMathParaPr>
@@ -10537,7 +10552,7 @@
             </p:txBody>
           </p:sp>
         </mc:Choice>
-        <mc:Fallback>
+        <mc:Fallback xmlns="">
           <p:sp>
             <p:nvSpPr>
               <p:cNvPr id="9" name="TextBox 8">
@@ -10632,8 +10647,8 @@
           </a:fontRef>
         </p:style>
       </p:cxnSp>
-      <mc:AlternateContent xmlns:mc="http://schemas.openxmlformats.org/markup-compatibility/2006">
-        <mc:Choice xmlns:a14="http://schemas.microsoft.com/office/drawing/2010/main" Requires="a14">
+      <mc:AlternateContent xmlns:mc="http://schemas.openxmlformats.org/markup-compatibility/2006" xmlns:a14="http://schemas.microsoft.com/office/drawing/2010/main">
+        <mc:Choice Requires="a14">
           <p:sp>
             <p:nvSpPr>
               <p:cNvPr id="14" name="TextBox 13">
@@ -10662,6 +10677,7 @@
               </a:bodyPr>
               <a:lstStyle/>
               <a:p>
+                <a:pPr/>
                 <a14:m>
                   <m:oMathPara xmlns:m="http://schemas.openxmlformats.org/officeDocument/2006/math">
                     <m:oMathParaPr>
@@ -10682,7 +10698,7 @@
             </p:txBody>
           </p:sp>
         </mc:Choice>
-        <mc:Fallback>
+        <mc:Fallback xmlns="">
           <p:sp>
             <p:nvSpPr>
               <p:cNvPr id="14" name="TextBox 13">
@@ -10727,8 +10743,8 @@
           </p:sp>
         </mc:Fallback>
       </mc:AlternateContent>
-      <mc:AlternateContent xmlns:mc="http://schemas.openxmlformats.org/markup-compatibility/2006">
-        <mc:Choice xmlns:a14="http://schemas.microsoft.com/office/drawing/2010/main" Requires="a14">
+      <mc:AlternateContent xmlns:mc="http://schemas.openxmlformats.org/markup-compatibility/2006" xmlns:a14="http://schemas.microsoft.com/office/drawing/2010/main">
+        <mc:Choice Requires="a14">
           <p:sp>
             <p:nvSpPr>
               <p:cNvPr id="15" name="TextBox 14">
@@ -10874,7 +10890,7 @@
             </p:txBody>
           </p:sp>
         </mc:Choice>
-        <mc:Fallback>
+        <mc:Fallback xmlns="">
           <p:sp>
             <p:nvSpPr>
               <p:cNvPr id="15" name="TextBox 14">
@@ -10924,8 +10940,8 @@
           </p:sp>
         </mc:Fallback>
       </mc:AlternateContent>
-      <mc:AlternateContent xmlns:mc="http://schemas.openxmlformats.org/markup-compatibility/2006">
-        <mc:Choice xmlns:a14="http://schemas.microsoft.com/office/drawing/2010/main" Requires="a14">
+      <mc:AlternateContent xmlns:mc="http://schemas.openxmlformats.org/markup-compatibility/2006" xmlns:a14="http://schemas.microsoft.com/office/drawing/2010/main">
+        <mc:Choice Requires="a14">
           <p:sp>
             <p:nvSpPr>
               <p:cNvPr id="16" name="TextBox 15">
@@ -11004,7 +11020,7 @@
             </p:txBody>
           </p:sp>
         </mc:Choice>
-        <mc:Fallback>
+        <mc:Fallback xmlns="">
           <p:sp>
             <p:nvSpPr>
               <p:cNvPr id="16" name="TextBox 15">
@@ -11054,8 +11070,8 @@
           </p:sp>
         </mc:Fallback>
       </mc:AlternateContent>
-      <mc:AlternateContent xmlns:mc="http://schemas.openxmlformats.org/markup-compatibility/2006">
-        <mc:Choice xmlns:a14="http://schemas.microsoft.com/office/drawing/2010/main" Requires="a14">
+      <mc:AlternateContent xmlns:mc="http://schemas.openxmlformats.org/markup-compatibility/2006" xmlns:a14="http://schemas.microsoft.com/office/drawing/2010/main">
+        <mc:Choice Requires="a14">
           <p:sp>
             <p:nvSpPr>
               <p:cNvPr id="17" name="TextBox 16">
@@ -11089,6 +11105,7 @@
               </a:bodyPr>
               <a:lstStyle/>
               <a:p>
+                <a:pPr/>
                 <a14:m>
                   <m:oMathPara xmlns:m="http://schemas.openxmlformats.org/officeDocument/2006/math">
                     <m:oMathParaPr>
@@ -11127,7 +11144,7 @@
             </p:txBody>
           </p:sp>
         </mc:Choice>
-        <mc:Fallback>
+        <mc:Fallback xmlns="">
           <p:sp>
             <p:nvSpPr>
               <p:cNvPr id="17" name="TextBox 16">
@@ -11219,8 +11236,8 @@
           </a:fontRef>
         </p:style>
       </p:cxnSp>
-      <mc:AlternateContent xmlns:mc="http://schemas.openxmlformats.org/markup-compatibility/2006">
-        <mc:Choice xmlns:a14="http://schemas.microsoft.com/office/drawing/2010/main" Requires="a14">
+      <mc:AlternateContent xmlns:mc="http://schemas.openxmlformats.org/markup-compatibility/2006" xmlns:a14="http://schemas.microsoft.com/office/drawing/2010/main">
+        <mc:Choice Requires="a14">
           <p:sp>
             <p:nvSpPr>
               <p:cNvPr id="20" name="TextBox 19">
@@ -11249,6 +11266,7 @@
               </a:bodyPr>
               <a:lstStyle/>
               <a:p>
+                <a:pPr/>
                 <a14:m>
                   <m:oMathPara xmlns:m="http://schemas.openxmlformats.org/officeDocument/2006/math">
                     <m:oMathParaPr>
@@ -11269,7 +11287,7 @@
             </p:txBody>
           </p:sp>
         </mc:Choice>
-        <mc:Fallback>
+        <mc:Fallback xmlns="">
           <p:sp>
             <p:nvSpPr>
               <p:cNvPr id="20" name="TextBox 19">
@@ -11398,8 +11416,8 @@
           </a:fontRef>
         </p:style>
       </p:cxnSp>
-      <mc:AlternateContent xmlns:mc="http://schemas.openxmlformats.org/markup-compatibility/2006">
-        <mc:Choice xmlns:a14="http://schemas.microsoft.com/office/drawing/2010/main" Requires="a14">
+      <mc:AlternateContent xmlns:mc="http://schemas.openxmlformats.org/markup-compatibility/2006" xmlns:a14="http://schemas.microsoft.com/office/drawing/2010/main">
+        <mc:Choice Requires="a14">
           <p:sp>
             <p:nvSpPr>
               <p:cNvPr id="27" name="TextBox 26">
@@ -11428,6 +11446,7 @@
               </a:bodyPr>
               <a:lstStyle/>
               <a:p>
+                <a:pPr/>
                 <a14:m>
                   <m:oMathPara xmlns:m="http://schemas.openxmlformats.org/officeDocument/2006/math">
                     <m:oMathParaPr>
@@ -11448,7 +11467,7 @@
             </p:txBody>
           </p:sp>
         </mc:Choice>
-        <mc:Fallback>
+        <mc:Fallback xmlns="">
           <p:sp>
             <p:nvSpPr>
               <p:cNvPr id="27" name="TextBox 26">
@@ -11493,8 +11512,8 @@
           </p:sp>
         </mc:Fallback>
       </mc:AlternateContent>
-      <mc:AlternateContent xmlns:mc="http://schemas.openxmlformats.org/markup-compatibility/2006">
-        <mc:Choice xmlns:a14="http://schemas.microsoft.com/office/drawing/2010/main" Requires="a14">
+      <mc:AlternateContent xmlns:mc="http://schemas.openxmlformats.org/markup-compatibility/2006" xmlns:a14="http://schemas.microsoft.com/office/drawing/2010/main">
+        <mc:Choice Requires="a14">
           <p:sp>
             <p:nvSpPr>
               <p:cNvPr id="28" name="TextBox 27">
@@ -11523,6 +11542,7 @@
               </a:bodyPr>
               <a:lstStyle/>
               <a:p>
+                <a:pPr/>
                 <a14:m>
                   <m:oMathPara xmlns:m="http://schemas.openxmlformats.org/officeDocument/2006/math">
                     <m:oMathParaPr>
@@ -11543,7 +11563,7 @@
             </p:txBody>
           </p:sp>
         </mc:Choice>
-        <mc:Fallback>
+        <mc:Fallback xmlns="">
           <p:sp>
             <p:nvSpPr>
               <p:cNvPr id="28" name="TextBox 27">
@@ -11588,8 +11608,8 @@
           </p:sp>
         </mc:Fallback>
       </mc:AlternateContent>
-      <mc:AlternateContent xmlns:mc="http://schemas.openxmlformats.org/markup-compatibility/2006">
-        <mc:Choice xmlns:a14="http://schemas.microsoft.com/office/drawing/2010/main" Requires="a14">
+      <mc:AlternateContent xmlns:mc="http://schemas.openxmlformats.org/markup-compatibility/2006" xmlns:a14="http://schemas.microsoft.com/office/drawing/2010/main">
+        <mc:Choice Requires="a14">
           <p:sp>
             <p:nvSpPr>
               <p:cNvPr id="29" name="TextBox 28">
@@ -11623,6 +11643,7 @@
               </a:bodyPr>
               <a:lstStyle/>
               <a:p>
+                <a:pPr/>
                 <a14:m>
                   <m:oMathPara xmlns:m="http://schemas.openxmlformats.org/officeDocument/2006/math">
                     <m:oMathParaPr>
@@ -11661,7 +11682,7 @@
             </p:txBody>
           </p:sp>
         </mc:Choice>
-        <mc:Fallback>
+        <mc:Fallback xmlns="">
           <p:sp>
             <p:nvSpPr>
               <p:cNvPr id="29" name="TextBox 28">
@@ -11754,8 +11775,8 @@
           </a:fontRef>
         </p:style>
       </p:cxnSp>
-      <mc:AlternateContent xmlns:mc="http://schemas.openxmlformats.org/markup-compatibility/2006">
-        <mc:Choice xmlns:a14="http://schemas.microsoft.com/office/drawing/2010/main" Requires="a14">
+      <mc:AlternateContent xmlns:mc="http://schemas.openxmlformats.org/markup-compatibility/2006" xmlns:a14="http://schemas.microsoft.com/office/drawing/2010/main">
+        <mc:Choice Requires="a14">
           <p:sp>
             <p:nvSpPr>
               <p:cNvPr id="33" name="TextBox 32">
@@ -11784,6 +11805,7 @@
               </a:bodyPr>
               <a:lstStyle/>
               <a:p>
+                <a:pPr/>
                 <a14:m>
                   <m:oMathPara xmlns:m="http://schemas.openxmlformats.org/officeDocument/2006/math">
                     <m:oMathParaPr>
@@ -11804,7 +11826,7 @@
             </p:txBody>
           </p:sp>
         </mc:Choice>
-        <mc:Fallback>
+        <mc:Fallback xmlns="">
           <p:sp>
             <p:nvSpPr>
               <p:cNvPr id="33" name="TextBox 32">
@@ -11849,8 +11871,8 @@
           </p:sp>
         </mc:Fallback>
       </mc:AlternateContent>
-      <mc:AlternateContent xmlns:mc="http://schemas.openxmlformats.org/markup-compatibility/2006">
-        <mc:Choice xmlns:a14="http://schemas.microsoft.com/office/drawing/2010/main" Requires="a14">
+      <mc:AlternateContent xmlns:mc="http://schemas.openxmlformats.org/markup-compatibility/2006" xmlns:a14="http://schemas.microsoft.com/office/drawing/2010/main">
+        <mc:Choice Requires="a14">
           <p:sp>
             <p:nvSpPr>
               <p:cNvPr id="36" name="TextBox 35">
@@ -11884,6 +11906,7 @@
               </a:bodyPr>
               <a:lstStyle/>
               <a:p>
+                <a:pPr/>
                 <a14:m>
                   <m:oMathPara xmlns:m="http://schemas.openxmlformats.org/officeDocument/2006/math">
                     <m:oMathParaPr>
@@ -11922,7 +11945,7 @@
             </p:txBody>
           </p:sp>
         </mc:Choice>
-        <mc:Fallback>
+        <mc:Fallback xmlns="">
           <p:sp>
             <p:nvSpPr>
               <p:cNvPr id="36" name="TextBox 35">
@@ -12017,8 +12040,8 @@
           </a:fontRef>
         </p:style>
       </p:cxnSp>
-      <mc:AlternateContent xmlns:mc="http://schemas.openxmlformats.org/markup-compatibility/2006">
-        <mc:Choice xmlns:a14="http://schemas.microsoft.com/office/drawing/2010/main" Requires="a14">
+      <mc:AlternateContent xmlns:mc="http://schemas.openxmlformats.org/markup-compatibility/2006" xmlns:a14="http://schemas.microsoft.com/office/drawing/2010/main">
+        <mc:Choice Requires="a14">
           <p:sp>
             <p:nvSpPr>
               <p:cNvPr id="54" name="TextBox 53">
@@ -12047,6 +12070,7 @@
               </a:bodyPr>
               <a:lstStyle/>
               <a:p>
+                <a:pPr/>
                 <a14:m>
                   <m:oMathPara xmlns:m="http://schemas.openxmlformats.org/officeDocument/2006/math">
                     <m:oMathParaPr>
@@ -12067,7 +12091,7 @@
             </p:txBody>
           </p:sp>
         </mc:Choice>
-        <mc:Fallback>
+        <mc:Fallback xmlns="">
           <p:sp>
             <p:nvSpPr>
               <p:cNvPr id="54" name="TextBox 53">
@@ -12112,8 +12136,8 @@
           </p:sp>
         </mc:Fallback>
       </mc:AlternateContent>
-      <mc:AlternateContent xmlns:mc="http://schemas.openxmlformats.org/markup-compatibility/2006">
-        <mc:Choice xmlns:a14="http://schemas.microsoft.com/office/drawing/2010/main" Requires="a14">
+      <mc:AlternateContent xmlns:mc="http://schemas.openxmlformats.org/markup-compatibility/2006" xmlns:a14="http://schemas.microsoft.com/office/drawing/2010/main">
+        <mc:Choice Requires="a14">
           <p:sp>
             <p:nvSpPr>
               <p:cNvPr id="70" name="TextBox 69">
@@ -12142,6 +12166,7 @@
               </a:bodyPr>
               <a:lstStyle/>
               <a:p>
+                <a:pPr/>
                 <a14:m>
                   <m:oMathPara xmlns:m="http://schemas.openxmlformats.org/officeDocument/2006/math">
                     <m:oMathParaPr>
@@ -12162,7 +12187,7 @@
             </p:txBody>
           </p:sp>
         </mc:Choice>
-        <mc:Fallback>
+        <mc:Fallback xmlns="">
           <p:sp>
             <p:nvSpPr>
               <p:cNvPr id="70" name="TextBox 69">
@@ -12252,8 +12277,8 @@
           </a:fontRef>
         </p:style>
       </p:cxnSp>
-      <mc:AlternateContent xmlns:mc="http://schemas.openxmlformats.org/markup-compatibility/2006">
-        <mc:Choice xmlns:a14="http://schemas.microsoft.com/office/drawing/2010/main" Requires="a14">
+      <mc:AlternateContent xmlns:mc="http://schemas.openxmlformats.org/markup-compatibility/2006" xmlns:a14="http://schemas.microsoft.com/office/drawing/2010/main">
+        <mc:Choice Requires="a14">
           <p:sp>
             <p:nvSpPr>
               <p:cNvPr id="73" name="TextBox 72">
@@ -12282,6 +12307,7 @@
               </a:bodyPr>
               <a:lstStyle/>
               <a:p>
+                <a:pPr/>
                 <a14:m>
                   <m:oMathPara xmlns:m="http://schemas.openxmlformats.org/officeDocument/2006/math">
                     <m:oMathParaPr>
@@ -12302,7 +12328,7 @@
             </p:txBody>
           </p:sp>
         </mc:Choice>
-        <mc:Fallback>
+        <mc:Fallback xmlns="">
           <p:sp>
             <p:nvSpPr>
               <p:cNvPr id="73" name="TextBox 72">
@@ -12347,8 +12373,8 @@
           </p:sp>
         </mc:Fallback>
       </mc:AlternateContent>
-      <mc:AlternateContent xmlns:mc="http://schemas.openxmlformats.org/markup-compatibility/2006">
-        <mc:Choice xmlns:a14="http://schemas.microsoft.com/office/drawing/2010/main" Requires="a14">
+      <mc:AlternateContent xmlns:mc="http://schemas.openxmlformats.org/markup-compatibility/2006" xmlns:a14="http://schemas.microsoft.com/office/drawing/2010/main">
+        <mc:Choice Requires="a14">
           <p:sp>
             <p:nvSpPr>
               <p:cNvPr id="75" name="TextBox 74">
@@ -12537,7 +12563,7 @@
             </p:txBody>
           </p:sp>
         </mc:Choice>
-        <mc:Fallback>
+        <mc:Fallback xmlns="">
           <p:sp>
             <p:nvSpPr>
               <p:cNvPr id="75" name="TextBox 74">
@@ -12587,8 +12613,8 @@
           </p:sp>
         </mc:Fallback>
       </mc:AlternateContent>
-      <mc:AlternateContent xmlns:mc="http://schemas.openxmlformats.org/markup-compatibility/2006">
-        <mc:Choice xmlns:a14="http://schemas.microsoft.com/office/drawing/2010/main" Requires="a14">
+      <mc:AlternateContent xmlns:mc="http://schemas.openxmlformats.org/markup-compatibility/2006" xmlns:a14="http://schemas.microsoft.com/office/drawing/2010/main">
+        <mc:Choice Requires="a14">
           <p:sp>
             <p:nvSpPr>
               <p:cNvPr id="78" name="TextBox 77">
@@ -12670,7 +12696,7 @@
             </p:txBody>
           </p:sp>
         </mc:Choice>
-        <mc:Fallback>
+        <mc:Fallback xmlns="">
           <p:sp>
             <p:nvSpPr>
               <p:cNvPr id="78" name="TextBox 77">
@@ -12762,8 +12788,8 @@
           </a:fontRef>
         </p:style>
       </p:cxnSp>
-      <mc:AlternateContent xmlns:mc="http://schemas.openxmlformats.org/markup-compatibility/2006">
-        <mc:Choice xmlns:a14="http://schemas.microsoft.com/office/drawing/2010/main" Requires="a14">
+      <mc:AlternateContent xmlns:mc="http://schemas.openxmlformats.org/markup-compatibility/2006" xmlns:a14="http://schemas.microsoft.com/office/drawing/2010/main">
+        <mc:Choice Requires="a14">
           <p:sp>
             <p:nvSpPr>
               <p:cNvPr id="81" name="TextBox 80">
@@ -12792,6 +12818,7 @@
               </a:bodyPr>
               <a:lstStyle/>
               <a:p>
+                <a:pPr/>
                 <a14:m>
                   <m:oMathPara xmlns:m="http://schemas.openxmlformats.org/officeDocument/2006/math">
                     <m:oMathParaPr>
@@ -12812,7 +12839,7 @@
             </p:txBody>
           </p:sp>
         </mc:Choice>
-        <mc:Fallback>
+        <mc:Fallback xmlns="">
           <p:sp>
             <p:nvSpPr>
               <p:cNvPr id="81" name="TextBox 80">
@@ -12943,8 +12970,8 @@
           </a:fontRef>
         </p:style>
       </p:cxnSp>
-      <mc:AlternateContent xmlns:mc="http://schemas.openxmlformats.org/markup-compatibility/2006">
-        <mc:Choice xmlns:a14="http://schemas.microsoft.com/office/drawing/2010/main" Requires="a14">
+      <mc:AlternateContent xmlns:mc="http://schemas.openxmlformats.org/markup-compatibility/2006" xmlns:a14="http://schemas.microsoft.com/office/drawing/2010/main">
+        <mc:Choice Requires="a14">
           <p:sp>
             <p:nvSpPr>
               <p:cNvPr id="99" name="TextBox 98">
@@ -12978,6 +13005,7 @@
               </a:bodyPr>
               <a:lstStyle/>
               <a:p>
+                <a:pPr/>
                 <a14:m>
                   <m:oMathPara xmlns:m="http://schemas.openxmlformats.org/officeDocument/2006/math">
                     <m:oMathParaPr>
@@ -13016,7 +13044,7 @@
             </p:txBody>
           </p:sp>
         </mc:Choice>
-        <mc:Fallback>
+        <mc:Fallback xmlns="">
           <p:sp>
             <p:nvSpPr>
               <p:cNvPr id="99" name="TextBox 98">
@@ -13153,8 +13181,8 @@
           </a:fontRef>
         </p:style>
       </p:cxnSp>
-      <mc:AlternateContent xmlns:mc="http://schemas.openxmlformats.org/markup-compatibility/2006">
-        <mc:Choice xmlns:a14="http://schemas.microsoft.com/office/drawing/2010/main" Requires="a14">
+      <mc:AlternateContent xmlns:mc="http://schemas.openxmlformats.org/markup-compatibility/2006" xmlns:a14="http://schemas.microsoft.com/office/drawing/2010/main">
+        <mc:Choice Requires="a14">
           <p:sp>
             <p:nvSpPr>
               <p:cNvPr id="114" name="TextBox 113">
@@ -13183,6 +13211,7 @@
               </a:bodyPr>
               <a:lstStyle/>
               <a:p>
+                <a:pPr/>
                 <a14:m>
                   <m:oMathPara xmlns:m="http://schemas.openxmlformats.org/officeDocument/2006/math">
                     <m:oMathParaPr>
@@ -13203,7 +13232,7 @@
             </p:txBody>
           </p:sp>
         </mc:Choice>
-        <mc:Fallback>
+        <mc:Fallback xmlns="">
           <p:sp>
             <p:nvSpPr>
               <p:cNvPr id="114" name="TextBox 113">
@@ -13248,8 +13277,8 @@
           </p:sp>
         </mc:Fallback>
       </mc:AlternateContent>
-      <mc:AlternateContent xmlns:mc="http://schemas.openxmlformats.org/markup-compatibility/2006">
-        <mc:Choice xmlns:a14="http://schemas.microsoft.com/office/drawing/2010/main" Requires="a14">
+      <mc:AlternateContent xmlns:mc="http://schemas.openxmlformats.org/markup-compatibility/2006" xmlns:a14="http://schemas.microsoft.com/office/drawing/2010/main">
+        <mc:Choice Requires="a14">
           <p:sp>
             <p:nvSpPr>
               <p:cNvPr id="124" name="TextBox 123">
@@ -13278,6 +13307,7 @@
               </a:bodyPr>
               <a:lstStyle/>
               <a:p>
+                <a:pPr/>
                 <a14:m>
                   <m:oMathPara xmlns:m="http://schemas.openxmlformats.org/officeDocument/2006/math">
                     <m:oMathParaPr>
@@ -13298,7 +13328,7 @@
             </p:txBody>
           </p:sp>
         </mc:Choice>
-        <mc:Fallback>
+        <mc:Fallback xmlns="">
           <p:sp>
             <p:nvSpPr>
               <p:cNvPr id="124" name="TextBox 123">
@@ -13343,8 +13373,8 @@
           </p:sp>
         </mc:Fallback>
       </mc:AlternateContent>
-      <mc:AlternateContent xmlns:mc="http://schemas.openxmlformats.org/markup-compatibility/2006">
-        <mc:Choice xmlns:a14="http://schemas.microsoft.com/office/drawing/2010/main" Requires="a14">
+      <mc:AlternateContent xmlns:mc="http://schemas.openxmlformats.org/markup-compatibility/2006" xmlns:a14="http://schemas.microsoft.com/office/drawing/2010/main">
+        <mc:Choice Requires="a14">
           <p:sp>
             <p:nvSpPr>
               <p:cNvPr id="126" name="TextBox 125">
@@ -13373,6 +13403,7 @@
               </a:bodyPr>
               <a:lstStyle/>
               <a:p>
+                <a:pPr/>
                 <a14:m>
                   <m:oMathPara xmlns:m="http://schemas.openxmlformats.org/officeDocument/2006/math">
                     <m:oMathParaPr>
@@ -13393,7 +13424,7 @@
             </p:txBody>
           </p:sp>
         </mc:Choice>
-        <mc:Fallback>
+        <mc:Fallback xmlns="">
           <p:sp>
             <p:nvSpPr>
               <p:cNvPr id="126" name="TextBox 125">
@@ -13438,8 +13469,8 @@
           </p:sp>
         </mc:Fallback>
       </mc:AlternateContent>
-      <mc:AlternateContent xmlns:mc="http://schemas.openxmlformats.org/markup-compatibility/2006">
-        <mc:Choice xmlns:a14="http://schemas.microsoft.com/office/drawing/2010/main" Requires="a14">
+      <mc:AlternateContent xmlns:mc="http://schemas.openxmlformats.org/markup-compatibility/2006" xmlns:a14="http://schemas.microsoft.com/office/drawing/2010/main">
+        <mc:Choice Requires="a14">
           <p:sp>
             <p:nvSpPr>
               <p:cNvPr id="127" name="TextBox 126">
@@ -13468,6 +13499,7 @@
               </a:bodyPr>
               <a:lstStyle/>
               <a:p>
+                <a:pPr/>
                 <a14:m>
                   <m:oMathPara xmlns:m="http://schemas.openxmlformats.org/officeDocument/2006/math">
                     <m:oMathParaPr>
@@ -13488,7 +13520,7 @@
             </p:txBody>
           </p:sp>
         </mc:Choice>
-        <mc:Fallback>
+        <mc:Fallback xmlns="">
           <p:sp>
             <p:nvSpPr>
               <p:cNvPr id="127" name="TextBox 126">
@@ -13533,8 +13565,8 @@
           </p:sp>
         </mc:Fallback>
       </mc:AlternateContent>
-      <mc:AlternateContent xmlns:mc="http://schemas.openxmlformats.org/markup-compatibility/2006">
-        <mc:Choice xmlns:a14="http://schemas.microsoft.com/office/drawing/2010/main" Requires="a14">
+      <mc:AlternateContent xmlns:mc="http://schemas.openxmlformats.org/markup-compatibility/2006" xmlns:a14="http://schemas.microsoft.com/office/drawing/2010/main">
+        <mc:Choice Requires="a14">
           <p:sp>
             <p:nvSpPr>
               <p:cNvPr id="128" name="TextBox 127">
@@ -13563,6 +13595,7 @@
               </a:bodyPr>
               <a:lstStyle/>
               <a:p>
+                <a:pPr/>
                 <a14:m>
                   <m:oMathPara xmlns:m="http://schemas.openxmlformats.org/officeDocument/2006/math">
                     <m:oMathParaPr>
@@ -13583,7 +13616,7 @@
             </p:txBody>
           </p:sp>
         </mc:Choice>
-        <mc:Fallback>
+        <mc:Fallback xmlns="">
           <p:sp>
             <p:nvSpPr>
               <p:cNvPr id="128" name="TextBox 127">
@@ -13628,8 +13661,8 @@
           </p:sp>
         </mc:Fallback>
       </mc:AlternateContent>
-      <mc:AlternateContent xmlns:mc="http://schemas.openxmlformats.org/markup-compatibility/2006">
-        <mc:Choice xmlns:a14="http://schemas.microsoft.com/office/drawing/2010/main" Requires="a14">
+      <mc:AlternateContent xmlns:mc="http://schemas.openxmlformats.org/markup-compatibility/2006" xmlns:a14="http://schemas.microsoft.com/office/drawing/2010/main">
+        <mc:Choice Requires="a14">
           <p:sp>
             <p:nvSpPr>
               <p:cNvPr id="129" name="TextBox 128">
@@ -13658,6 +13691,7 @@
               </a:bodyPr>
               <a:lstStyle/>
               <a:p>
+                <a:pPr/>
                 <a14:m>
                   <m:oMathPara xmlns:m="http://schemas.openxmlformats.org/officeDocument/2006/math">
                     <m:oMathParaPr>
@@ -13678,7 +13712,7 @@
             </p:txBody>
           </p:sp>
         </mc:Choice>
-        <mc:Fallback>
+        <mc:Fallback xmlns="">
           <p:sp>
             <p:nvSpPr>
               <p:cNvPr id="129" name="TextBox 128">
@@ -13723,8 +13757,8 @@
           </p:sp>
         </mc:Fallback>
       </mc:AlternateContent>
-      <mc:AlternateContent xmlns:mc="http://schemas.openxmlformats.org/markup-compatibility/2006">
-        <mc:Choice xmlns:a14="http://schemas.microsoft.com/office/drawing/2010/main" Requires="a14">
+      <mc:AlternateContent xmlns:mc="http://schemas.openxmlformats.org/markup-compatibility/2006" xmlns:a14="http://schemas.microsoft.com/office/drawing/2010/main">
+        <mc:Choice Requires="a14">
           <p:sp>
             <p:nvSpPr>
               <p:cNvPr id="130" name="TextBox 129">
@@ -13753,6 +13787,7 @@
               </a:bodyPr>
               <a:lstStyle/>
               <a:p>
+                <a:pPr/>
                 <a14:m>
                   <m:oMathPara xmlns:m="http://schemas.openxmlformats.org/officeDocument/2006/math">
                     <m:oMathParaPr>
@@ -13773,7 +13808,7 @@
             </p:txBody>
           </p:sp>
         </mc:Choice>
-        <mc:Fallback>
+        <mc:Fallback xmlns="">
           <p:sp>
             <p:nvSpPr>
               <p:cNvPr id="130" name="TextBox 129">
@@ -13818,8 +13853,8 @@
           </p:sp>
         </mc:Fallback>
       </mc:AlternateContent>
-      <mc:AlternateContent xmlns:mc="http://schemas.openxmlformats.org/markup-compatibility/2006">
-        <mc:Choice xmlns:a14="http://schemas.microsoft.com/office/drawing/2010/main" Requires="a14">
+      <mc:AlternateContent xmlns:mc="http://schemas.openxmlformats.org/markup-compatibility/2006" xmlns:a14="http://schemas.microsoft.com/office/drawing/2010/main">
+        <mc:Choice Requires="a14">
           <p:sp>
             <p:nvSpPr>
               <p:cNvPr id="131" name="TextBox 130">
@@ -13848,6 +13883,7 @@
               </a:bodyPr>
               <a:lstStyle/>
               <a:p>
+                <a:pPr/>
                 <a14:m>
                   <m:oMathPara xmlns:m="http://schemas.openxmlformats.org/officeDocument/2006/math">
                     <m:oMathParaPr>
@@ -13868,7 +13904,7 @@
             </p:txBody>
           </p:sp>
         </mc:Choice>
-        <mc:Fallback>
+        <mc:Fallback xmlns="">
           <p:sp>
             <p:nvSpPr>
               <p:cNvPr id="131" name="TextBox 130">
@@ -13913,8 +13949,8 @@
           </p:sp>
         </mc:Fallback>
       </mc:AlternateContent>
-      <mc:AlternateContent xmlns:mc="http://schemas.openxmlformats.org/markup-compatibility/2006">
-        <mc:Choice xmlns:a14="http://schemas.microsoft.com/office/drawing/2010/main" Requires="a14">
+      <mc:AlternateContent xmlns:mc="http://schemas.openxmlformats.org/markup-compatibility/2006" xmlns:a14="http://schemas.microsoft.com/office/drawing/2010/main">
+        <mc:Choice Requires="a14">
           <p:sp>
             <p:nvSpPr>
               <p:cNvPr id="132" name="TextBox 131">
@@ -13943,6 +13979,7 @@
               </a:bodyPr>
               <a:lstStyle/>
               <a:p>
+                <a:pPr/>
                 <a14:m>
                   <m:oMathPara xmlns:m="http://schemas.openxmlformats.org/officeDocument/2006/math">
                     <m:oMathParaPr>
@@ -13963,7 +14000,7 @@
             </p:txBody>
           </p:sp>
         </mc:Choice>
-        <mc:Fallback>
+        <mc:Fallback xmlns="">
           <p:sp>
             <p:nvSpPr>
               <p:cNvPr id="132" name="TextBox 131">
@@ -14008,8 +14045,8 @@
           </p:sp>
         </mc:Fallback>
       </mc:AlternateContent>
-      <mc:AlternateContent xmlns:mc="http://schemas.openxmlformats.org/markup-compatibility/2006">
-        <mc:Choice xmlns:a14="http://schemas.microsoft.com/office/drawing/2010/main" Requires="a14">
+      <mc:AlternateContent xmlns:mc="http://schemas.openxmlformats.org/markup-compatibility/2006" xmlns:a14="http://schemas.microsoft.com/office/drawing/2010/main">
+        <mc:Choice Requires="a14">
           <p:sp>
             <p:nvSpPr>
               <p:cNvPr id="135" name="TextBox 134">
@@ -14038,6 +14075,7 @@
               </a:bodyPr>
               <a:lstStyle/>
               <a:p>
+                <a:pPr/>
                 <a14:m>
                   <m:oMathPara xmlns:m="http://schemas.openxmlformats.org/officeDocument/2006/math">
                     <m:oMathParaPr>
@@ -14058,7 +14096,7 @@
             </p:txBody>
           </p:sp>
         </mc:Choice>
-        <mc:Fallback>
+        <mc:Fallback xmlns="">
           <p:sp>
             <p:nvSpPr>
               <p:cNvPr id="135" name="TextBox 134">
@@ -14103,8 +14141,8 @@
           </p:sp>
         </mc:Fallback>
       </mc:AlternateContent>
-      <mc:AlternateContent xmlns:mc="http://schemas.openxmlformats.org/markup-compatibility/2006">
-        <mc:Choice xmlns:a14="http://schemas.microsoft.com/office/drawing/2010/main" Requires="a14">
+      <mc:AlternateContent xmlns:mc="http://schemas.openxmlformats.org/markup-compatibility/2006" xmlns:a14="http://schemas.microsoft.com/office/drawing/2010/main">
+        <mc:Choice Requires="a14">
           <p:sp>
             <p:nvSpPr>
               <p:cNvPr id="138" name="TextBox 137">
@@ -14133,6 +14171,7 @@
               </a:bodyPr>
               <a:lstStyle/>
               <a:p>
+                <a:pPr/>
                 <a14:m>
                   <m:oMathPara xmlns:m="http://schemas.openxmlformats.org/officeDocument/2006/math">
                     <m:oMathParaPr>
@@ -14153,7 +14192,7 @@
             </p:txBody>
           </p:sp>
         </mc:Choice>
-        <mc:Fallback>
+        <mc:Fallback xmlns="">
           <p:sp>
             <p:nvSpPr>
               <p:cNvPr id="138" name="TextBox 137">
@@ -14198,8 +14237,8 @@
           </p:sp>
         </mc:Fallback>
       </mc:AlternateContent>
-      <mc:AlternateContent xmlns:mc="http://schemas.openxmlformats.org/markup-compatibility/2006">
-        <mc:Choice xmlns:a14="http://schemas.microsoft.com/office/drawing/2010/main" Requires="a14">
+      <mc:AlternateContent xmlns:mc="http://schemas.openxmlformats.org/markup-compatibility/2006" xmlns:a14="http://schemas.microsoft.com/office/drawing/2010/main">
+        <mc:Choice Requires="a14">
           <p:sp>
             <p:nvSpPr>
               <p:cNvPr id="139" name="TextBox 138">
@@ -14228,6 +14267,7 @@
               </a:bodyPr>
               <a:lstStyle/>
               <a:p>
+                <a:pPr/>
                 <a14:m>
                   <m:oMathPara xmlns:m="http://schemas.openxmlformats.org/officeDocument/2006/math">
                     <m:oMathParaPr>
@@ -14248,7 +14288,7 @@
             </p:txBody>
           </p:sp>
         </mc:Choice>
-        <mc:Fallback>
+        <mc:Fallback xmlns="">
           <p:sp>
             <p:nvSpPr>
               <p:cNvPr id="139" name="TextBox 138">
@@ -14297,6 +14337,3171 @@
     <p:extLst>
       <p:ext uri="{BB962C8B-B14F-4D97-AF65-F5344CB8AC3E}">
         <p14:creationId xmlns:p14="http://schemas.microsoft.com/office/powerpoint/2010/main" val="2071258672"/>
+      </p:ext>
+    </p:extLst>
+  </p:cSld>
+  <p:clrMapOvr>
+    <a:masterClrMapping/>
+  </p:clrMapOvr>
+</p:sld>
+</file>
+
+<file path=ppt/slides/slide4.xml><?xml version="1.0" encoding="utf-8"?>
+<p:sld xmlns:a="http://schemas.openxmlformats.org/drawingml/2006/main" xmlns:r="http://schemas.openxmlformats.org/officeDocument/2006/relationships" xmlns:p="http://schemas.openxmlformats.org/presentationml/2006/main">
+  <p:cSld>
+    <p:spTree>
+      <p:nvGrpSpPr>
+        <p:cNvPr id="1" name=""/>
+        <p:cNvGrpSpPr/>
+        <p:nvPr/>
+      </p:nvGrpSpPr>
+      <p:grpSpPr>
+        <a:xfrm>
+          <a:off x="0" y="0"/>
+          <a:ext cx="0" cy="0"/>
+          <a:chOff x="0" y="0"/>
+          <a:chExt cx="0" cy="0"/>
+        </a:xfrm>
+      </p:grpSpPr>
+      <p:grpSp>
+        <p:nvGrpSpPr>
+          <p:cNvPr id="129" name="Group 128">
+            <a:extLst>
+              <a:ext uri="{FF2B5EF4-FFF2-40B4-BE49-F238E27FC236}">
+                <a16:creationId xmlns:a16="http://schemas.microsoft.com/office/drawing/2014/main" id="{9019E3BD-46EE-D562-0C8E-08C65E9FB764}"/>
+              </a:ext>
+            </a:extLst>
+          </p:cNvPr>
+          <p:cNvGrpSpPr/>
+          <p:nvPr/>
+        </p:nvGrpSpPr>
+        <p:grpSpPr>
+          <a:xfrm>
+            <a:off x="2725385" y="2704875"/>
+            <a:ext cx="3031125" cy="2770137"/>
+            <a:chOff x="2725385" y="2704875"/>
+            <a:chExt cx="3031125" cy="2770137"/>
+          </a:xfrm>
+        </p:grpSpPr>
+        <p:sp>
+          <p:nvSpPr>
+            <p:cNvPr id="4" name="Oval 3">
+              <a:extLst>
+                <a:ext uri="{FF2B5EF4-FFF2-40B4-BE49-F238E27FC236}">
+                  <a16:creationId xmlns:a16="http://schemas.microsoft.com/office/drawing/2014/main" id="{6E698438-12E1-2AE9-E83C-4CB03A6D5F37}"/>
+                </a:ext>
+              </a:extLst>
+            </p:cNvPr>
+            <p:cNvSpPr>
+              <a:spLocks noChangeAspect="1"/>
+            </p:cNvSpPr>
+            <p:nvPr/>
+          </p:nvSpPr>
+          <p:spPr>
+            <a:xfrm>
+              <a:off x="4199870" y="2704875"/>
+              <a:ext cx="360000" cy="360000"/>
+            </a:xfrm>
+            <a:prstGeom prst="ellipse">
+              <a:avLst/>
+            </a:prstGeom>
+          </p:spPr>
+          <p:style>
+            <a:lnRef idx="2">
+              <a:schemeClr val="accent1">
+                <a:shade val="50000"/>
+              </a:schemeClr>
+            </a:lnRef>
+            <a:fillRef idx="1">
+              <a:schemeClr val="accent1"/>
+            </a:fillRef>
+            <a:effectRef idx="0">
+              <a:schemeClr val="accent1"/>
+            </a:effectRef>
+            <a:fontRef idx="minor">
+              <a:schemeClr val="lt1"/>
+            </a:fontRef>
+          </p:style>
+          <p:txBody>
+            <a:bodyPr rtlCol="0" anchor="ctr"/>
+            <a:lstStyle/>
+            <a:p>
+              <a:pPr algn="ctr"/>
+              <a:endParaRPr lang="en-IL" sz="1200"/>
+            </a:p>
+          </p:txBody>
+        </p:sp>
+        <p:cxnSp>
+          <p:nvCxnSpPr>
+            <p:cNvPr id="6" name="Straight Arrow Connector 5">
+              <a:extLst>
+                <a:ext uri="{FF2B5EF4-FFF2-40B4-BE49-F238E27FC236}">
+                  <a16:creationId xmlns:a16="http://schemas.microsoft.com/office/drawing/2014/main" id="{D95B48A2-8F46-8693-9646-23B76FB9D38C}"/>
+                </a:ext>
+              </a:extLst>
+            </p:cNvPr>
+            <p:cNvCxnSpPr>
+              <a:cxnSpLocks/>
+              <a:stCxn id="4" idx="3"/>
+              <a:endCxn id="7" idx="0"/>
+            </p:cNvCxnSpPr>
+            <p:nvPr/>
+          </p:nvCxnSpPr>
+          <p:spPr>
+            <a:xfrm flipH="1">
+              <a:off x="3313380" y="3012154"/>
+              <a:ext cx="939211" cy="665471"/>
+            </a:xfrm>
+            <a:prstGeom prst="straightConnector1">
+              <a:avLst/>
+            </a:prstGeom>
+            <a:ln>
+              <a:tailEnd type="triangle"/>
+            </a:ln>
+          </p:spPr>
+          <p:style>
+            <a:lnRef idx="1">
+              <a:schemeClr val="accent1"/>
+            </a:lnRef>
+            <a:fillRef idx="0">
+              <a:schemeClr val="accent1"/>
+            </a:fillRef>
+            <a:effectRef idx="0">
+              <a:schemeClr val="accent1"/>
+            </a:effectRef>
+            <a:fontRef idx="minor">
+              <a:schemeClr val="tx1"/>
+            </a:fontRef>
+          </p:style>
+        </p:cxnSp>
+        <mc:AlternateContent xmlns:mc="http://schemas.openxmlformats.org/markup-compatibility/2006">
+          <mc:Choice xmlns:a14="http://schemas.microsoft.com/office/drawing/2010/main" Requires="a14">
+            <p:sp>
+              <p:nvSpPr>
+                <p:cNvPr id="7" name="Oval 6">
+                  <a:extLst>
+                    <a:ext uri="{FF2B5EF4-FFF2-40B4-BE49-F238E27FC236}">
+                      <a16:creationId xmlns:a16="http://schemas.microsoft.com/office/drawing/2014/main" id="{FADA9624-C248-A141-623C-C5544F20D069}"/>
+                    </a:ext>
+                  </a:extLst>
+                </p:cNvPr>
+                <p:cNvSpPr>
+                  <a:spLocks noChangeAspect="1"/>
+                </p:cNvSpPr>
+                <p:nvPr/>
+              </p:nvSpPr>
+              <p:spPr>
+                <a:xfrm>
+                  <a:off x="3133380" y="3677625"/>
+                  <a:ext cx="360000" cy="360000"/>
+                </a:xfrm>
+                <a:prstGeom prst="ellipse">
+                  <a:avLst/>
+                </a:prstGeom>
+              </p:spPr>
+              <p:style>
+                <a:lnRef idx="2">
+                  <a:schemeClr val="accent1">
+                    <a:shade val="50000"/>
+                  </a:schemeClr>
+                </a:lnRef>
+                <a:fillRef idx="1">
+                  <a:schemeClr val="accent1"/>
+                </a:fillRef>
+                <a:effectRef idx="0">
+                  <a:schemeClr val="accent1"/>
+                </a:effectRef>
+                <a:fontRef idx="minor">
+                  <a:schemeClr val="lt1"/>
+                </a:fontRef>
+              </p:style>
+              <p:txBody>
+                <a:bodyPr rtlCol="0" anchor="ctr"/>
+                <a:lstStyle/>
+                <a:p>
+                  <a:pPr algn="ctr"/>
+                  <a14:m>
+                    <m:oMathPara xmlns:m="http://schemas.openxmlformats.org/officeDocument/2006/math">
+                      <m:oMathParaPr>
+                        <m:jc m:val="centerGroup"/>
+                      </m:oMathParaPr>
+                      <m:oMath xmlns:m="http://schemas.openxmlformats.org/officeDocument/2006/math">
+                        <m:r>
+                          <a:rPr lang="en-US" sz="1200" b="0" i="1" smtClean="0">
+                            <a:latin typeface="Cambria Math" panose="02040503050406030204" pitchFamily="18" charset="0"/>
+                          </a:rPr>
+                          <m:t>=</m:t>
+                        </m:r>
+                      </m:oMath>
+                    </m:oMathPara>
+                  </a14:m>
+                  <a:endParaRPr lang="en-IL" sz="1200" dirty="0"/>
+                </a:p>
+              </p:txBody>
+            </p:sp>
+          </mc:Choice>
+          <mc:Fallback>
+            <p:sp>
+              <p:nvSpPr>
+                <p:cNvPr id="7" name="Oval 6">
+                  <a:extLst>
+                    <a:ext uri="{FF2B5EF4-FFF2-40B4-BE49-F238E27FC236}">
+                      <a16:creationId xmlns:a16="http://schemas.microsoft.com/office/drawing/2014/main" id="{FADA9624-C248-A141-623C-C5544F20D069}"/>
+                    </a:ext>
+                  </a:extLst>
+                </p:cNvPr>
+                <p:cNvSpPr>
+                  <a:spLocks noRot="1" noChangeAspect="1" noMove="1" noResize="1" noEditPoints="1" noAdjustHandles="1" noChangeArrowheads="1" noChangeShapeType="1" noTextEdit="1"/>
+                </p:cNvSpPr>
+                <p:nvPr/>
+              </p:nvSpPr>
+              <p:spPr>
+                <a:xfrm>
+                  <a:off x="3133380" y="3677625"/>
+                  <a:ext cx="360000" cy="360000"/>
+                </a:xfrm>
+                <a:prstGeom prst="ellipse">
+                  <a:avLst/>
+                </a:prstGeom>
+                <a:blipFill>
+                  <a:blip r:embed="rId2"/>
+                  <a:stretch>
+                    <a:fillRect/>
+                  </a:stretch>
+                </a:blipFill>
+              </p:spPr>
+              <p:txBody>
+                <a:bodyPr/>
+                <a:lstStyle/>
+                <a:p>
+                  <a:r>
+                    <a:rPr lang="en-IL">
+                      <a:noFill/>
+                    </a:rPr>
+                    <a:t> </a:t>
+                  </a:r>
+                </a:p>
+              </p:txBody>
+            </p:sp>
+          </mc:Fallback>
+        </mc:AlternateContent>
+        <p:cxnSp>
+          <p:nvCxnSpPr>
+            <p:cNvPr id="13" name="Straight Arrow Connector 12">
+              <a:extLst>
+                <a:ext uri="{FF2B5EF4-FFF2-40B4-BE49-F238E27FC236}">
+                  <a16:creationId xmlns:a16="http://schemas.microsoft.com/office/drawing/2014/main" id="{2FBA1AF4-6305-5C78-4DD1-BCAD0A686284}"/>
+                </a:ext>
+              </a:extLst>
+            </p:cNvPr>
+            <p:cNvCxnSpPr>
+              <a:cxnSpLocks/>
+              <a:stCxn id="32" idx="3"/>
+              <a:endCxn id="14" idx="0"/>
+            </p:cNvCxnSpPr>
+            <p:nvPr/>
+          </p:nvCxnSpPr>
+          <p:spPr>
+            <a:xfrm flipH="1">
+              <a:off x="5051035" y="3978660"/>
+              <a:ext cx="47515" cy="232721"/>
+            </a:xfrm>
+            <a:prstGeom prst="straightConnector1">
+              <a:avLst/>
+            </a:prstGeom>
+            <a:ln>
+              <a:tailEnd type="triangle"/>
+            </a:ln>
+          </p:spPr>
+          <p:style>
+            <a:lnRef idx="1">
+              <a:schemeClr val="accent1"/>
+            </a:lnRef>
+            <a:fillRef idx="0">
+              <a:schemeClr val="accent1"/>
+            </a:fillRef>
+            <a:effectRef idx="0">
+              <a:schemeClr val="accent1"/>
+            </a:effectRef>
+            <a:fontRef idx="minor">
+              <a:schemeClr val="tx1"/>
+            </a:fontRef>
+          </p:style>
+        </p:cxnSp>
+        <p:sp>
+          <p:nvSpPr>
+            <p:cNvPr id="14" name="Oval 13">
+              <a:extLst>
+                <a:ext uri="{FF2B5EF4-FFF2-40B4-BE49-F238E27FC236}">
+                  <a16:creationId xmlns:a16="http://schemas.microsoft.com/office/drawing/2014/main" id="{B62A2526-0B89-B6F6-7473-7B5293508586}"/>
+                </a:ext>
+              </a:extLst>
+            </p:cNvPr>
+            <p:cNvSpPr>
+              <a:spLocks noChangeAspect="1"/>
+            </p:cNvSpPr>
+            <p:nvPr/>
+          </p:nvSpPr>
+          <p:spPr>
+            <a:xfrm>
+              <a:off x="4871035" y="4211381"/>
+              <a:ext cx="360000" cy="360000"/>
+            </a:xfrm>
+            <a:prstGeom prst="ellipse">
+              <a:avLst/>
+            </a:prstGeom>
+          </p:spPr>
+          <p:style>
+            <a:lnRef idx="2">
+              <a:schemeClr val="accent1">
+                <a:shade val="50000"/>
+              </a:schemeClr>
+            </a:lnRef>
+            <a:fillRef idx="1">
+              <a:schemeClr val="accent1"/>
+            </a:fillRef>
+            <a:effectRef idx="0">
+              <a:schemeClr val="accent1"/>
+            </a:effectRef>
+            <a:fontRef idx="minor">
+              <a:schemeClr val="lt1"/>
+            </a:fontRef>
+          </p:style>
+          <p:txBody>
+            <a:bodyPr rtlCol="0" anchor="ctr"/>
+            <a:lstStyle/>
+            <a:p>
+              <a:pPr algn="ctr"/>
+              <a:r>
+                <a:rPr lang="en-IL" sz="1200" dirty="0"/>
+                <a:t>+</a:t>
+              </a:r>
+            </a:p>
+          </p:txBody>
+        </p:sp>
+        <p:cxnSp>
+          <p:nvCxnSpPr>
+            <p:cNvPr id="17" name="Straight Arrow Connector 16">
+              <a:extLst>
+                <a:ext uri="{FF2B5EF4-FFF2-40B4-BE49-F238E27FC236}">
+                  <a16:creationId xmlns:a16="http://schemas.microsoft.com/office/drawing/2014/main" id="{1E5CCFFC-72A0-D07D-CB1B-B22C8C1BBBED}"/>
+                </a:ext>
+              </a:extLst>
+            </p:cNvPr>
+            <p:cNvCxnSpPr>
+              <a:cxnSpLocks/>
+              <a:stCxn id="7" idx="3"/>
+              <a:endCxn id="18" idx="0"/>
+            </p:cNvCxnSpPr>
+            <p:nvPr/>
+          </p:nvCxnSpPr>
+          <p:spPr>
+            <a:xfrm flipH="1">
+              <a:off x="2973491" y="3984904"/>
+              <a:ext cx="212610" cy="152163"/>
+            </a:xfrm>
+            <a:prstGeom prst="straightConnector1">
+              <a:avLst/>
+            </a:prstGeom>
+            <a:ln>
+              <a:tailEnd type="triangle"/>
+            </a:ln>
+          </p:spPr>
+          <p:style>
+            <a:lnRef idx="1">
+              <a:schemeClr val="accent1"/>
+            </a:lnRef>
+            <a:fillRef idx="0">
+              <a:schemeClr val="accent1"/>
+            </a:fillRef>
+            <a:effectRef idx="0">
+              <a:schemeClr val="accent1"/>
+            </a:effectRef>
+            <a:fontRef idx="minor">
+              <a:schemeClr val="tx1"/>
+            </a:fontRef>
+          </p:style>
+        </p:cxnSp>
+        <mc:AlternateContent xmlns:mc="http://schemas.openxmlformats.org/markup-compatibility/2006">
+          <mc:Choice xmlns:a14="http://schemas.microsoft.com/office/drawing/2010/main" Requires="a14">
+            <p:sp>
+              <p:nvSpPr>
+                <p:cNvPr id="18" name="Oval 17">
+                  <a:extLst>
+                    <a:ext uri="{FF2B5EF4-FFF2-40B4-BE49-F238E27FC236}">
+                      <a16:creationId xmlns:a16="http://schemas.microsoft.com/office/drawing/2014/main" id="{5F6571BB-0F09-D7B4-C7BA-38A4086A3616}"/>
+                    </a:ext>
+                  </a:extLst>
+                </p:cNvPr>
+                <p:cNvSpPr>
+                  <a:spLocks noChangeAspect="1"/>
+                </p:cNvSpPr>
+                <p:nvPr/>
+              </p:nvSpPr>
+              <p:spPr>
+                <a:xfrm>
+                  <a:off x="2793491" y="4137067"/>
+                  <a:ext cx="360000" cy="360000"/>
+                </a:xfrm>
+                <a:prstGeom prst="ellipse">
+                  <a:avLst/>
+                </a:prstGeom>
+              </p:spPr>
+              <p:style>
+                <a:lnRef idx="2">
+                  <a:schemeClr val="accent1">
+                    <a:shade val="50000"/>
+                  </a:schemeClr>
+                </a:lnRef>
+                <a:fillRef idx="1">
+                  <a:schemeClr val="accent1"/>
+                </a:fillRef>
+                <a:effectRef idx="0">
+                  <a:schemeClr val="accent1"/>
+                </a:effectRef>
+                <a:fontRef idx="minor">
+                  <a:schemeClr val="lt1"/>
+                </a:fontRef>
+              </p:style>
+              <p:txBody>
+                <a:bodyPr rtlCol="0" anchor="ctr"/>
+                <a:lstStyle/>
+                <a:p>
+                  <a:pPr algn="ctr"/>
+                  <a14:m>
+                    <m:oMathPara xmlns:m="http://schemas.openxmlformats.org/officeDocument/2006/math">
+                      <m:oMathParaPr>
+                        <m:jc m:val="centerGroup"/>
+                      </m:oMathParaPr>
+                      <m:oMath xmlns:m="http://schemas.openxmlformats.org/officeDocument/2006/math">
+                        <m:r>
+                          <a:rPr lang="en-US" sz="1200" b="0" i="1" smtClean="0">
+                            <a:latin typeface="Cambria Math" panose="02040503050406030204" pitchFamily="18" charset="0"/>
+                          </a:rPr>
+                          <m:t>𝑎</m:t>
+                        </m:r>
+                      </m:oMath>
+                    </m:oMathPara>
+                  </a14:m>
+                  <a:endParaRPr lang="en-IL" sz="1200" dirty="0"/>
+                </a:p>
+              </p:txBody>
+            </p:sp>
+          </mc:Choice>
+          <mc:Fallback>
+            <p:sp>
+              <p:nvSpPr>
+                <p:cNvPr id="18" name="Oval 17">
+                  <a:extLst>
+                    <a:ext uri="{FF2B5EF4-FFF2-40B4-BE49-F238E27FC236}">
+                      <a16:creationId xmlns:a16="http://schemas.microsoft.com/office/drawing/2014/main" id="{5F6571BB-0F09-D7B4-C7BA-38A4086A3616}"/>
+                    </a:ext>
+                  </a:extLst>
+                </p:cNvPr>
+                <p:cNvSpPr>
+                  <a:spLocks noRot="1" noChangeAspect="1" noMove="1" noResize="1" noEditPoints="1" noAdjustHandles="1" noChangeArrowheads="1" noChangeShapeType="1" noTextEdit="1"/>
+                </p:cNvSpPr>
+                <p:nvPr/>
+              </p:nvSpPr>
+              <p:spPr>
+                <a:xfrm>
+                  <a:off x="2793491" y="4137067"/>
+                  <a:ext cx="360000" cy="360000"/>
+                </a:xfrm>
+                <a:prstGeom prst="ellipse">
+                  <a:avLst/>
+                </a:prstGeom>
+                <a:blipFill>
+                  <a:blip r:embed="rId3"/>
+                  <a:stretch>
+                    <a:fillRect/>
+                  </a:stretch>
+                </a:blipFill>
+              </p:spPr>
+              <p:txBody>
+                <a:bodyPr/>
+                <a:lstStyle/>
+                <a:p>
+                  <a:r>
+                    <a:rPr lang="en-IL">
+                      <a:noFill/>
+                    </a:rPr>
+                    <a:t> </a:t>
+                  </a:r>
+                </a:p>
+              </p:txBody>
+            </p:sp>
+          </mc:Fallback>
+        </mc:AlternateContent>
+        <p:cxnSp>
+          <p:nvCxnSpPr>
+            <p:cNvPr id="20" name="Straight Arrow Connector 19">
+              <a:extLst>
+                <a:ext uri="{FF2B5EF4-FFF2-40B4-BE49-F238E27FC236}">
+                  <a16:creationId xmlns:a16="http://schemas.microsoft.com/office/drawing/2014/main" id="{A69ECAB3-C925-75D4-51CB-67EB5C60CE3F}"/>
+                </a:ext>
+              </a:extLst>
+            </p:cNvPr>
+            <p:cNvCxnSpPr>
+              <a:cxnSpLocks/>
+              <a:stCxn id="7" idx="5"/>
+              <a:endCxn id="21" idx="0"/>
+            </p:cNvCxnSpPr>
+            <p:nvPr/>
+          </p:nvCxnSpPr>
+          <p:spPr>
+            <a:xfrm>
+              <a:off x="3440659" y="3984904"/>
+              <a:ext cx="176378" cy="224559"/>
+            </a:xfrm>
+            <a:prstGeom prst="straightConnector1">
+              <a:avLst/>
+            </a:prstGeom>
+            <a:ln>
+              <a:tailEnd type="triangle"/>
+            </a:ln>
+          </p:spPr>
+          <p:style>
+            <a:lnRef idx="1">
+              <a:schemeClr val="accent1"/>
+            </a:lnRef>
+            <a:fillRef idx="0">
+              <a:schemeClr val="accent1"/>
+            </a:fillRef>
+            <a:effectRef idx="0">
+              <a:schemeClr val="accent1"/>
+            </a:effectRef>
+            <a:fontRef idx="minor">
+              <a:schemeClr val="tx1"/>
+            </a:fontRef>
+          </p:style>
+        </p:cxnSp>
+        <mc:AlternateContent xmlns:mc="http://schemas.openxmlformats.org/markup-compatibility/2006">
+          <mc:Choice xmlns:a14="http://schemas.microsoft.com/office/drawing/2010/main" Requires="a14">
+            <p:sp>
+              <p:nvSpPr>
+                <p:cNvPr id="21" name="Oval 20">
+                  <a:extLst>
+                    <a:ext uri="{FF2B5EF4-FFF2-40B4-BE49-F238E27FC236}">
+                      <a16:creationId xmlns:a16="http://schemas.microsoft.com/office/drawing/2014/main" id="{A4DD8119-A7B6-35D1-ADD1-3109F6BAB457}"/>
+                    </a:ext>
+                  </a:extLst>
+                </p:cNvPr>
+                <p:cNvSpPr>
+                  <a:spLocks noChangeAspect="1"/>
+                </p:cNvSpPr>
+                <p:nvPr/>
+              </p:nvSpPr>
+              <p:spPr>
+                <a:xfrm>
+                  <a:off x="3437037" y="4209463"/>
+                  <a:ext cx="360000" cy="360000"/>
+                </a:xfrm>
+                <a:prstGeom prst="ellipse">
+                  <a:avLst/>
+                </a:prstGeom>
+              </p:spPr>
+              <p:style>
+                <a:lnRef idx="2">
+                  <a:schemeClr val="accent1">
+                    <a:shade val="50000"/>
+                  </a:schemeClr>
+                </a:lnRef>
+                <a:fillRef idx="1">
+                  <a:schemeClr val="accent1"/>
+                </a:fillRef>
+                <a:effectRef idx="0">
+                  <a:schemeClr val="accent1"/>
+                </a:effectRef>
+                <a:fontRef idx="minor">
+                  <a:schemeClr val="lt1"/>
+                </a:fontRef>
+              </p:style>
+              <p:txBody>
+                <a:bodyPr rtlCol="0" anchor="ctr"/>
+                <a:lstStyle/>
+                <a:p>
+                  <a:pPr algn="ctr"/>
+                  <a14:m>
+                    <m:oMathPara xmlns:m="http://schemas.openxmlformats.org/officeDocument/2006/math">
+                      <m:oMathParaPr>
+                        <m:jc m:val="centerGroup"/>
+                      </m:oMathParaPr>
+                      <m:oMath xmlns:m="http://schemas.openxmlformats.org/officeDocument/2006/math">
+                        <m:r>
+                          <a:rPr lang="en-US" sz="1200" b="0" i="1" smtClean="0">
+                            <a:latin typeface="Cambria Math" panose="02040503050406030204" pitchFamily="18" charset="0"/>
+                          </a:rPr>
+                          <m:t>∗</m:t>
+                        </m:r>
+                      </m:oMath>
+                    </m:oMathPara>
+                  </a14:m>
+                  <a:endParaRPr lang="en-IL" sz="1200" dirty="0"/>
+                </a:p>
+              </p:txBody>
+            </p:sp>
+          </mc:Choice>
+          <mc:Fallback>
+            <p:sp>
+              <p:nvSpPr>
+                <p:cNvPr id="21" name="Oval 20">
+                  <a:extLst>
+                    <a:ext uri="{FF2B5EF4-FFF2-40B4-BE49-F238E27FC236}">
+                      <a16:creationId xmlns:a16="http://schemas.microsoft.com/office/drawing/2014/main" id="{A4DD8119-A7B6-35D1-ADD1-3109F6BAB457}"/>
+                    </a:ext>
+                  </a:extLst>
+                </p:cNvPr>
+                <p:cNvSpPr>
+                  <a:spLocks noRot="1" noChangeAspect="1" noMove="1" noResize="1" noEditPoints="1" noAdjustHandles="1" noChangeArrowheads="1" noChangeShapeType="1" noTextEdit="1"/>
+                </p:cNvSpPr>
+                <p:nvPr/>
+              </p:nvSpPr>
+              <p:spPr>
+                <a:xfrm>
+                  <a:off x="3437037" y="4209463"/>
+                  <a:ext cx="360000" cy="360000"/>
+                </a:xfrm>
+                <a:prstGeom prst="ellipse">
+                  <a:avLst/>
+                </a:prstGeom>
+                <a:blipFill>
+                  <a:blip r:embed="rId4"/>
+                  <a:stretch>
+                    <a:fillRect/>
+                  </a:stretch>
+                </a:blipFill>
+              </p:spPr>
+              <p:txBody>
+                <a:bodyPr/>
+                <a:lstStyle/>
+                <a:p>
+                  <a:r>
+                    <a:rPr lang="en-IL">
+                      <a:noFill/>
+                    </a:rPr>
+                    <a:t> </a:t>
+                  </a:r>
+                </a:p>
+              </p:txBody>
+            </p:sp>
+          </mc:Fallback>
+        </mc:AlternateContent>
+        <p:cxnSp>
+          <p:nvCxnSpPr>
+            <p:cNvPr id="24" name="Straight Arrow Connector 23">
+              <a:extLst>
+                <a:ext uri="{FF2B5EF4-FFF2-40B4-BE49-F238E27FC236}">
+                  <a16:creationId xmlns:a16="http://schemas.microsoft.com/office/drawing/2014/main" id="{B9BFE471-20E4-816B-B704-4CAF84ACE862}"/>
+                </a:ext>
+              </a:extLst>
+            </p:cNvPr>
+            <p:cNvCxnSpPr>
+              <a:cxnSpLocks/>
+              <a:stCxn id="4" idx="4"/>
+              <a:endCxn id="25" idx="0"/>
+            </p:cNvCxnSpPr>
+            <p:nvPr/>
+          </p:nvCxnSpPr>
+          <p:spPr>
+            <a:xfrm flipH="1">
+              <a:off x="4374664" y="3064875"/>
+              <a:ext cx="5206" cy="172210"/>
+            </a:xfrm>
+            <a:prstGeom prst="straightConnector1">
+              <a:avLst/>
+            </a:prstGeom>
+            <a:ln>
+              <a:tailEnd type="triangle"/>
+            </a:ln>
+          </p:spPr>
+          <p:style>
+            <a:lnRef idx="1">
+              <a:schemeClr val="accent1"/>
+            </a:lnRef>
+            <a:fillRef idx="0">
+              <a:schemeClr val="accent1"/>
+            </a:fillRef>
+            <a:effectRef idx="0">
+              <a:schemeClr val="accent1"/>
+            </a:effectRef>
+            <a:fontRef idx="minor">
+              <a:schemeClr val="tx1"/>
+            </a:fontRef>
+          </p:style>
+        </p:cxnSp>
+        <mc:AlternateContent xmlns:mc="http://schemas.openxmlformats.org/markup-compatibility/2006">
+          <mc:Choice xmlns:a14="http://schemas.microsoft.com/office/drawing/2010/main" Requires="a14">
+            <p:sp>
+              <p:nvSpPr>
+                <p:cNvPr id="25" name="Oval 24">
+                  <a:extLst>
+                    <a:ext uri="{FF2B5EF4-FFF2-40B4-BE49-F238E27FC236}">
+                      <a16:creationId xmlns:a16="http://schemas.microsoft.com/office/drawing/2014/main" id="{AA67561A-2793-4B06-474A-0410366E740E}"/>
+                    </a:ext>
+                  </a:extLst>
+                </p:cNvPr>
+                <p:cNvSpPr>
+                  <a:spLocks noChangeAspect="1"/>
+                </p:cNvSpPr>
+                <p:nvPr/>
+              </p:nvSpPr>
+              <p:spPr>
+                <a:xfrm>
+                  <a:off x="4194664" y="3237085"/>
+                  <a:ext cx="360000" cy="360000"/>
+                </a:xfrm>
+                <a:prstGeom prst="ellipse">
+                  <a:avLst/>
+                </a:prstGeom>
+              </p:spPr>
+              <p:style>
+                <a:lnRef idx="2">
+                  <a:schemeClr val="accent1">
+                    <a:shade val="50000"/>
+                  </a:schemeClr>
+                </a:lnRef>
+                <a:fillRef idx="1">
+                  <a:schemeClr val="accent1"/>
+                </a:fillRef>
+                <a:effectRef idx="0">
+                  <a:schemeClr val="accent1"/>
+                </a:effectRef>
+                <a:fontRef idx="minor">
+                  <a:schemeClr val="lt1"/>
+                </a:fontRef>
+              </p:style>
+              <p:txBody>
+                <a:bodyPr rtlCol="0" anchor="ctr"/>
+                <a:lstStyle/>
+                <a:p>
+                  <a:pPr algn="ctr"/>
+                  <a14:m>
+                    <m:oMathPara xmlns:m="http://schemas.openxmlformats.org/officeDocument/2006/math">
+                      <m:oMathParaPr>
+                        <m:jc m:val="centerGroup"/>
+                      </m:oMathParaPr>
+                      <m:oMath xmlns:m="http://schemas.openxmlformats.org/officeDocument/2006/math">
+                        <m:r>
+                          <a:rPr lang="en-US" sz="1200" b="0" i="1" smtClean="0">
+                            <a:latin typeface="Cambria Math" panose="02040503050406030204" pitchFamily="18" charset="0"/>
+                          </a:rPr>
+                          <m:t>=</m:t>
+                        </m:r>
+                      </m:oMath>
+                    </m:oMathPara>
+                  </a14:m>
+                  <a:endParaRPr lang="en-IL" sz="1200" dirty="0"/>
+                </a:p>
+              </p:txBody>
+            </p:sp>
+          </mc:Choice>
+          <mc:Fallback>
+            <p:sp>
+              <p:nvSpPr>
+                <p:cNvPr id="25" name="Oval 24">
+                  <a:extLst>
+                    <a:ext uri="{FF2B5EF4-FFF2-40B4-BE49-F238E27FC236}">
+                      <a16:creationId xmlns:a16="http://schemas.microsoft.com/office/drawing/2014/main" id="{AA67561A-2793-4B06-474A-0410366E740E}"/>
+                    </a:ext>
+                  </a:extLst>
+                </p:cNvPr>
+                <p:cNvSpPr>
+                  <a:spLocks noRot="1" noChangeAspect="1" noMove="1" noResize="1" noEditPoints="1" noAdjustHandles="1" noChangeArrowheads="1" noChangeShapeType="1" noTextEdit="1"/>
+                </p:cNvSpPr>
+                <p:nvPr/>
+              </p:nvSpPr>
+              <p:spPr>
+                <a:xfrm>
+                  <a:off x="4194664" y="3237085"/>
+                  <a:ext cx="360000" cy="360000"/>
+                </a:xfrm>
+                <a:prstGeom prst="ellipse">
+                  <a:avLst/>
+                </a:prstGeom>
+                <a:blipFill>
+                  <a:blip r:embed="rId5"/>
+                  <a:stretch>
+                    <a:fillRect/>
+                  </a:stretch>
+                </a:blipFill>
+              </p:spPr>
+              <p:txBody>
+                <a:bodyPr/>
+                <a:lstStyle/>
+                <a:p>
+                  <a:r>
+                    <a:rPr lang="en-IL">
+                      <a:noFill/>
+                    </a:rPr>
+                    <a:t> </a:t>
+                  </a:r>
+                </a:p>
+              </p:txBody>
+            </p:sp>
+          </mc:Fallback>
+        </mc:AlternateContent>
+        <p:cxnSp>
+          <p:nvCxnSpPr>
+            <p:cNvPr id="26" name="Straight Arrow Connector 25">
+              <a:extLst>
+                <a:ext uri="{FF2B5EF4-FFF2-40B4-BE49-F238E27FC236}">
+                  <a16:creationId xmlns:a16="http://schemas.microsoft.com/office/drawing/2014/main" id="{C78D96A0-477D-A253-7D1B-6FB16457A9C2}"/>
+                </a:ext>
+              </a:extLst>
+            </p:cNvPr>
+            <p:cNvCxnSpPr>
+              <a:cxnSpLocks/>
+              <a:stCxn id="25" idx="3"/>
+              <a:endCxn id="27" idx="0"/>
+            </p:cNvCxnSpPr>
+            <p:nvPr/>
+          </p:nvCxnSpPr>
+          <p:spPr>
+            <a:xfrm flipH="1">
+              <a:off x="4050907" y="3544364"/>
+              <a:ext cx="196478" cy="161408"/>
+            </a:xfrm>
+            <a:prstGeom prst="straightConnector1">
+              <a:avLst/>
+            </a:prstGeom>
+            <a:ln>
+              <a:tailEnd type="triangle"/>
+            </a:ln>
+          </p:spPr>
+          <p:style>
+            <a:lnRef idx="1">
+              <a:schemeClr val="accent1"/>
+            </a:lnRef>
+            <a:fillRef idx="0">
+              <a:schemeClr val="accent1"/>
+            </a:fillRef>
+            <a:effectRef idx="0">
+              <a:schemeClr val="accent1"/>
+            </a:effectRef>
+            <a:fontRef idx="minor">
+              <a:schemeClr val="tx1"/>
+            </a:fontRef>
+          </p:style>
+        </p:cxnSp>
+        <mc:AlternateContent xmlns:mc="http://schemas.openxmlformats.org/markup-compatibility/2006">
+          <mc:Choice xmlns:a14="http://schemas.microsoft.com/office/drawing/2010/main" Requires="a14">
+            <p:sp>
+              <p:nvSpPr>
+                <p:cNvPr id="27" name="Oval 26">
+                  <a:extLst>
+                    <a:ext uri="{FF2B5EF4-FFF2-40B4-BE49-F238E27FC236}">
+                      <a16:creationId xmlns:a16="http://schemas.microsoft.com/office/drawing/2014/main" id="{5CABA4B1-BBB6-4F70-0312-779991612476}"/>
+                    </a:ext>
+                  </a:extLst>
+                </p:cNvPr>
+                <p:cNvSpPr>
+                  <a:spLocks noChangeAspect="1"/>
+                </p:cNvSpPr>
+                <p:nvPr/>
+              </p:nvSpPr>
+              <p:spPr>
+                <a:xfrm>
+                  <a:off x="3870907" y="3705772"/>
+                  <a:ext cx="360000" cy="360000"/>
+                </a:xfrm>
+                <a:prstGeom prst="ellipse">
+                  <a:avLst/>
+                </a:prstGeom>
+              </p:spPr>
+              <p:style>
+                <a:lnRef idx="2">
+                  <a:schemeClr val="accent1">
+                    <a:shade val="50000"/>
+                  </a:schemeClr>
+                </a:lnRef>
+                <a:fillRef idx="1">
+                  <a:schemeClr val="accent1"/>
+                </a:fillRef>
+                <a:effectRef idx="0">
+                  <a:schemeClr val="accent1"/>
+                </a:effectRef>
+                <a:fontRef idx="minor">
+                  <a:schemeClr val="lt1"/>
+                </a:fontRef>
+              </p:style>
+              <p:txBody>
+                <a:bodyPr rtlCol="0" anchor="ctr"/>
+                <a:lstStyle/>
+                <a:p>
+                  <a:pPr algn="ctr"/>
+                  <a14:m>
+                    <m:oMathPara xmlns:m="http://schemas.openxmlformats.org/officeDocument/2006/math">
+                      <m:oMathParaPr>
+                        <m:jc m:val="centerGroup"/>
+                      </m:oMathParaPr>
+                      <m:oMath xmlns:m="http://schemas.openxmlformats.org/officeDocument/2006/math">
+                        <m:r>
+                          <a:rPr lang="en-US" sz="1200" b="0" i="1" smtClean="0">
+                            <a:latin typeface="Cambria Math" panose="02040503050406030204" pitchFamily="18" charset="0"/>
+                          </a:rPr>
+                          <m:t>𝑥</m:t>
+                        </m:r>
+                      </m:oMath>
+                    </m:oMathPara>
+                  </a14:m>
+                  <a:endParaRPr lang="en-IL" sz="1200" dirty="0"/>
+                </a:p>
+              </p:txBody>
+            </p:sp>
+          </mc:Choice>
+          <mc:Fallback>
+            <p:sp>
+              <p:nvSpPr>
+                <p:cNvPr id="27" name="Oval 26">
+                  <a:extLst>
+                    <a:ext uri="{FF2B5EF4-FFF2-40B4-BE49-F238E27FC236}">
+                      <a16:creationId xmlns:a16="http://schemas.microsoft.com/office/drawing/2014/main" id="{5CABA4B1-BBB6-4F70-0312-779991612476}"/>
+                    </a:ext>
+                  </a:extLst>
+                </p:cNvPr>
+                <p:cNvSpPr>
+                  <a:spLocks noRot="1" noChangeAspect="1" noMove="1" noResize="1" noEditPoints="1" noAdjustHandles="1" noChangeArrowheads="1" noChangeShapeType="1" noTextEdit="1"/>
+                </p:cNvSpPr>
+                <p:nvPr/>
+              </p:nvSpPr>
+              <p:spPr>
+                <a:xfrm>
+                  <a:off x="3870907" y="3705772"/>
+                  <a:ext cx="360000" cy="360000"/>
+                </a:xfrm>
+                <a:prstGeom prst="ellipse">
+                  <a:avLst/>
+                </a:prstGeom>
+                <a:blipFill>
+                  <a:blip r:embed="rId6"/>
+                  <a:stretch>
+                    <a:fillRect/>
+                  </a:stretch>
+                </a:blipFill>
+              </p:spPr>
+              <p:txBody>
+                <a:bodyPr/>
+                <a:lstStyle/>
+                <a:p>
+                  <a:r>
+                    <a:rPr lang="en-IL">
+                      <a:noFill/>
+                    </a:rPr>
+                    <a:t> </a:t>
+                  </a:r>
+                </a:p>
+              </p:txBody>
+            </p:sp>
+          </mc:Fallback>
+        </mc:AlternateContent>
+        <p:cxnSp>
+          <p:nvCxnSpPr>
+            <p:cNvPr id="28" name="Straight Arrow Connector 27">
+              <a:extLst>
+                <a:ext uri="{FF2B5EF4-FFF2-40B4-BE49-F238E27FC236}">
+                  <a16:creationId xmlns:a16="http://schemas.microsoft.com/office/drawing/2014/main" id="{ED30413D-B2FA-469E-4421-091CF1537EAB}"/>
+                </a:ext>
+              </a:extLst>
+            </p:cNvPr>
+            <p:cNvCxnSpPr>
+              <a:cxnSpLocks/>
+              <a:stCxn id="25" idx="5"/>
+              <a:endCxn id="29" idx="0"/>
+            </p:cNvCxnSpPr>
+            <p:nvPr/>
+          </p:nvCxnSpPr>
+          <p:spPr>
+            <a:xfrm>
+              <a:off x="4501943" y="3544364"/>
+              <a:ext cx="145341" cy="174665"/>
+            </a:xfrm>
+            <a:prstGeom prst="straightConnector1">
+              <a:avLst/>
+            </a:prstGeom>
+            <a:ln>
+              <a:tailEnd type="triangle"/>
+            </a:ln>
+          </p:spPr>
+          <p:style>
+            <a:lnRef idx="1">
+              <a:schemeClr val="accent1"/>
+            </a:lnRef>
+            <a:fillRef idx="0">
+              <a:schemeClr val="accent1"/>
+            </a:fillRef>
+            <a:effectRef idx="0">
+              <a:schemeClr val="accent1"/>
+            </a:effectRef>
+            <a:fontRef idx="minor">
+              <a:schemeClr val="tx1"/>
+            </a:fontRef>
+          </p:style>
+        </p:cxnSp>
+        <mc:AlternateContent xmlns:mc="http://schemas.openxmlformats.org/markup-compatibility/2006">
+          <mc:Choice xmlns:a14="http://schemas.microsoft.com/office/drawing/2010/main" Requires="a14">
+            <p:sp>
+              <p:nvSpPr>
+                <p:cNvPr id="29" name="Oval 28">
+                  <a:extLst>
+                    <a:ext uri="{FF2B5EF4-FFF2-40B4-BE49-F238E27FC236}">
+                      <a16:creationId xmlns:a16="http://schemas.microsoft.com/office/drawing/2014/main" id="{21AB6488-6C98-29B9-517C-2E5EC1760422}"/>
+                    </a:ext>
+                  </a:extLst>
+                </p:cNvPr>
+                <p:cNvSpPr>
+                  <a:spLocks noChangeAspect="1"/>
+                </p:cNvSpPr>
+                <p:nvPr/>
+              </p:nvSpPr>
+              <p:spPr>
+                <a:xfrm>
+                  <a:off x="4467284" y="3719029"/>
+                  <a:ext cx="360000" cy="360000"/>
+                </a:xfrm>
+                <a:prstGeom prst="ellipse">
+                  <a:avLst/>
+                </a:prstGeom>
+              </p:spPr>
+              <p:style>
+                <a:lnRef idx="2">
+                  <a:schemeClr val="accent1">
+                    <a:shade val="50000"/>
+                  </a:schemeClr>
+                </a:lnRef>
+                <a:fillRef idx="1">
+                  <a:schemeClr val="accent1"/>
+                </a:fillRef>
+                <a:effectRef idx="0">
+                  <a:schemeClr val="accent1"/>
+                </a:effectRef>
+                <a:fontRef idx="minor">
+                  <a:schemeClr val="lt1"/>
+                </a:fontRef>
+              </p:style>
+              <p:txBody>
+                <a:bodyPr rtlCol="0" anchor="ctr"/>
+                <a:lstStyle/>
+                <a:p>
+                  <a:pPr algn="ctr"/>
+                  <a14:m>
+                    <m:oMathPara xmlns:m="http://schemas.openxmlformats.org/officeDocument/2006/math">
+                      <m:oMathParaPr>
+                        <m:jc m:val="centerGroup"/>
+                      </m:oMathParaPr>
+                      <m:oMath xmlns:m="http://schemas.openxmlformats.org/officeDocument/2006/math">
+                        <m:r>
+                          <a:rPr lang="en-US" sz="1200" b="0" i="1" smtClean="0">
+                            <a:latin typeface="Cambria Math" panose="02040503050406030204" pitchFamily="18" charset="0"/>
+                          </a:rPr>
+                          <m:t>𝑦</m:t>
+                        </m:r>
+                      </m:oMath>
+                    </m:oMathPara>
+                  </a14:m>
+                  <a:endParaRPr lang="en-IL" sz="1200" dirty="0"/>
+                </a:p>
+              </p:txBody>
+            </p:sp>
+          </mc:Choice>
+          <mc:Fallback>
+            <p:sp>
+              <p:nvSpPr>
+                <p:cNvPr id="29" name="Oval 28">
+                  <a:extLst>
+                    <a:ext uri="{FF2B5EF4-FFF2-40B4-BE49-F238E27FC236}">
+                      <a16:creationId xmlns:a16="http://schemas.microsoft.com/office/drawing/2014/main" id="{21AB6488-6C98-29B9-517C-2E5EC1760422}"/>
+                    </a:ext>
+                  </a:extLst>
+                </p:cNvPr>
+                <p:cNvSpPr>
+                  <a:spLocks noRot="1" noChangeAspect="1" noMove="1" noResize="1" noEditPoints="1" noAdjustHandles="1" noChangeArrowheads="1" noChangeShapeType="1" noTextEdit="1"/>
+                </p:cNvSpPr>
+                <p:nvPr/>
+              </p:nvSpPr>
+              <p:spPr>
+                <a:xfrm>
+                  <a:off x="4467284" y="3719029"/>
+                  <a:ext cx="360000" cy="360000"/>
+                </a:xfrm>
+                <a:prstGeom prst="ellipse">
+                  <a:avLst/>
+                </a:prstGeom>
+                <a:blipFill>
+                  <a:blip r:embed="rId7"/>
+                  <a:stretch>
+                    <a:fillRect/>
+                  </a:stretch>
+                </a:blipFill>
+              </p:spPr>
+              <p:txBody>
+                <a:bodyPr/>
+                <a:lstStyle/>
+                <a:p>
+                  <a:r>
+                    <a:rPr lang="en-IL">
+                      <a:noFill/>
+                    </a:rPr>
+                    <a:t> </a:t>
+                  </a:r>
+                </a:p>
+              </p:txBody>
+            </p:sp>
+          </mc:Fallback>
+        </mc:AlternateContent>
+        <p:cxnSp>
+          <p:nvCxnSpPr>
+            <p:cNvPr id="31" name="Straight Arrow Connector 30">
+              <a:extLst>
+                <a:ext uri="{FF2B5EF4-FFF2-40B4-BE49-F238E27FC236}">
+                  <a16:creationId xmlns:a16="http://schemas.microsoft.com/office/drawing/2014/main" id="{FA1044CA-ACF1-E86F-7613-26A0E9B58075}"/>
+                </a:ext>
+              </a:extLst>
+            </p:cNvPr>
+            <p:cNvCxnSpPr>
+              <a:cxnSpLocks/>
+              <a:stCxn id="4" idx="5"/>
+              <a:endCxn id="32" idx="0"/>
+            </p:cNvCxnSpPr>
+            <p:nvPr/>
+          </p:nvCxnSpPr>
+          <p:spPr>
+            <a:xfrm>
+              <a:off x="4507149" y="3012154"/>
+              <a:ext cx="718680" cy="659227"/>
+            </a:xfrm>
+            <a:prstGeom prst="straightConnector1">
+              <a:avLst/>
+            </a:prstGeom>
+            <a:ln>
+              <a:tailEnd type="triangle"/>
+            </a:ln>
+          </p:spPr>
+          <p:style>
+            <a:lnRef idx="1">
+              <a:schemeClr val="accent1"/>
+            </a:lnRef>
+            <a:fillRef idx="0">
+              <a:schemeClr val="accent1"/>
+            </a:fillRef>
+            <a:effectRef idx="0">
+              <a:schemeClr val="accent1"/>
+            </a:effectRef>
+            <a:fontRef idx="minor">
+              <a:schemeClr val="tx1"/>
+            </a:fontRef>
+          </p:style>
+        </p:cxnSp>
+        <mc:AlternateContent xmlns:mc="http://schemas.openxmlformats.org/markup-compatibility/2006">
+          <mc:Choice xmlns:a14="http://schemas.microsoft.com/office/drawing/2010/main" Requires="a14">
+            <p:sp>
+              <p:nvSpPr>
+                <p:cNvPr id="32" name="Oval 31">
+                  <a:extLst>
+                    <a:ext uri="{FF2B5EF4-FFF2-40B4-BE49-F238E27FC236}">
+                      <a16:creationId xmlns:a16="http://schemas.microsoft.com/office/drawing/2014/main" id="{1E5BF887-CDED-D70D-DFA0-0EA39D6E4D62}"/>
+                    </a:ext>
+                  </a:extLst>
+                </p:cNvPr>
+                <p:cNvSpPr>
+                  <a:spLocks noChangeAspect="1"/>
+                </p:cNvSpPr>
+                <p:nvPr/>
+              </p:nvSpPr>
+              <p:spPr>
+                <a:xfrm>
+                  <a:off x="5045829" y="3671381"/>
+                  <a:ext cx="360000" cy="360000"/>
+                </a:xfrm>
+                <a:prstGeom prst="ellipse">
+                  <a:avLst/>
+                </a:prstGeom>
+              </p:spPr>
+              <p:style>
+                <a:lnRef idx="2">
+                  <a:schemeClr val="accent1">
+                    <a:shade val="50000"/>
+                  </a:schemeClr>
+                </a:lnRef>
+                <a:fillRef idx="1">
+                  <a:schemeClr val="accent1"/>
+                </a:fillRef>
+                <a:effectRef idx="0">
+                  <a:schemeClr val="accent1"/>
+                </a:effectRef>
+                <a:fontRef idx="minor">
+                  <a:schemeClr val="lt1"/>
+                </a:fontRef>
+              </p:style>
+              <p:txBody>
+                <a:bodyPr rtlCol="0" anchor="ctr"/>
+                <a:lstStyle/>
+                <a:p>
+                  <a:pPr algn="ctr"/>
+                  <a14:m>
+                    <m:oMathPara xmlns:m="http://schemas.openxmlformats.org/officeDocument/2006/math">
+                      <m:oMathParaPr>
+                        <m:jc m:val="centerGroup"/>
+                      </m:oMathParaPr>
+                      <m:oMath xmlns:m="http://schemas.openxmlformats.org/officeDocument/2006/math">
+                        <m:r>
+                          <a:rPr lang="en-US" sz="1200" b="0" i="1" smtClean="0">
+                            <a:latin typeface="Cambria Math" panose="02040503050406030204" pitchFamily="18" charset="0"/>
+                          </a:rPr>
+                          <m:t>&lt;</m:t>
+                        </m:r>
+                      </m:oMath>
+                    </m:oMathPara>
+                  </a14:m>
+                  <a:endParaRPr lang="en-IL" sz="1200" dirty="0"/>
+                </a:p>
+              </p:txBody>
+            </p:sp>
+          </mc:Choice>
+          <mc:Fallback>
+            <p:sp>
+              <p:nvSpPr>
+                <p:cNvPr id="32" name="Oval 31">
+                  <a:extLst>
+                    <a:ext uri="{FF2B5EF4-FFF2-40B4-BE49-F238E27FC236}">
+                      <a16:creationId xmlns:a16="http://schemas.microsoft.com/office/drawing/2014/main" id="{1E5BF887-CDED-D70D-DFA0-0EA39D6E4D62}"/>
+                    </a:ext>
+                  </a:extLst>
+                </p:cNvPr>
+                <p:cNvSpPr>
+                  <a:spLocks noRot="1" noChangeAspect="1" noMove="1" noResize="1" noEditPoints="1" noAdjustHandles="1" noChangeArrowheads="1" noChangeShapeType="1" noTextEdit="1"/>
+                </p:cNvSpPr>
+                <p:nvPr/>
+              </p:nvSpPr>
+              <p:spPr>
+                <a:xfrm>
+                  <a:off x="5045829" y="3671381"/>
+                  <a:ext cx="360000" cy="360000"/>
+                </a:xfrm>
+                <a:prstGeom prst="ellipse">
+                  <a:avLst/>
+                </a:prstGeom>
+                <a:blipFill>
+                  <a:blip r:embed="rId8"/>
+                  <a:stretch>
+                    <a:fillRect/>
+                  </a:stretch>
+                </a:blipFill>
+              </p:spPr>
+              <p:txBody>
+                <a:bodyPr/>
+                <a:lstStyle/>
+                <a:p>
+                  <a:r>
+                    <a:rPr lang="en-IL">
+                      <a:noFill/>
+                    </a:rPr>
+                    <a:t> </a:t>
+                  </a:r>
+                </a:p>
+              </p:txBody>
+            </p:sp>
+          </mc:Fallback>
+        </mc:AlternateContent>
+        <p:cxnSp>
+          <p:nvCxnSpPr>
+            <p:cNvPr id="35" name="Straight Arrow Connector 34">
+              <a:extLst>
+                <a:ext uri="{FF2B5EF4-FFF2-40B4-BE49-F238E27FC236}">
+                  <a16:creationId xmlns:a16="http://schemas.microsoft.com/office/drawing/2014/main" id="{567E405C-A91D-1C7E-553E-9F988DBDDCBD}"/>
+                </a:ext>
+              </a:extLst>
+            </p:cNvPr>
+            <p:cNvCxnSpPr>
+              <a:cxnSpLocks/>
+              <a:stCxn id="32" idx="5"/>
+              <a:endCxn id="36" idx="0"/>
+            </p:cNvCxnSpPr>
+            <p:nvPr/>
+          </p:nvCxnSpPr>
+          <p:spPr>
+            <a:xfrm>
+              <a:off x="5353108" y="3978660"/>
+              <a:ext cx="223402" cy="258546"/>
+            </a:xfrm>
+            <a:prstGeom prst="straightConnector1">
+              <a:avLst/>
+            </a:prstGeom>
+            <a:ln>
+              <a:tailEnd type="triangle"/>
+            </a:ln>
+          </p:spPr>
+          <p:style>
+            <a:lnRef idx="1">
+              <a:schemeClr val="accent1"/>
+            </a:lnRef>
+            <a:fillRef idx="0">
+              <a:schemeClr val="accent1"/>
+            </a:fillRef>
+            <a:effectRef idx="0">
+              <a:schemeClr val="accent1"/>
+            </a:effectRef>
+            <a:fontRef idx="minor">
+              <a:schemeClr val="tx1"/>
+            </a:fontRef>
+          </p:style>
+        </p:cxnSp>
+        <mc:AlternateContent xmlns:mc="http://schemas.openxmlformats.org/markup-compatibility/2006">
+          <mc:Choice xmlns:a14="http://schemas.microsoft.com/office/drawing/2010/main" Requires="a14">
+            <p:sp>
+              <p:nvSpPr>
+                <p:cNvPr id="36" name="Oval 35">
+                  <a:extLst>
+                    <a:ext uri="{FF2B5EF4-FFF2-40B4-BE49-F238E27FC236}">
+                      <a16:creationId xmlns:a16="http://schemas.microsoft.com/office/drawing/2014/main" id="{46FDFF81-C9FF-A469-E903-607AFB37B1D4}"/>
+                    </a:ext>
+                  </a:extLst>
+                </p:cNvPr>
+                <p:cNvSpPr>
+                  <a:spLocks noChangeAspect="1"/>
+                </p:cNvSpPr>
+                <p:nvPr/>
+              </p:nvSpPr>
+              <p:spPr>
+                <a:xfrm>
+                  <a:off x="5396510" y="4237206"/>
+                  <a:ext cx="360000" cy="360000"/>
+                </a:xfrm>
+                <a:prstGeom prst="ellipse">
+                  <a:avLst/>
+                </a:prstGeom>
+              </p:spPr>
+              <p:style>
+                <a:lnRef idx="2">
+                  <a:schemeClr val="accent1">
+                    <a:shade val="50000"/>
+                  </a:schemeClr>
+                </a:lnRef>
+                <a:fillRef idx="1">
+                  <a:schemeClr val="accent1"/>
+                </a:fillRef>
+                <a:effectRef idx="0">
+                  <a:schemeClr val="accent1"/>
+                </a:effectRef>
+                <a:fontRef idx="minor">
+                  <a:schemeClr val="lt1"/>
+                </a:fontRef>
+              </p:style>
+              <p:txBody>
+                <a:bodyPr rtlCol="0" anchor="ctr"/>
+                <a:lstStyle/>
+                <a:p>
+                  <a:pPr algn="ctr"/>
+                  <a14:m>
+                    <m:oMathPara xmlns:m="http://schemas.openxmlformats.org/officeDocument/2006/math">
+                      <m:oMathParaPr>
+                        <m:jc m:val="centerGroup"/>
+                      </m:oMathParaPr>
+                      <m:oMath xmlns:m="http://schemas.openxmlformats.org/officeDocument/2006/math">
+                        <m:r>
+                          <a:rPr lang="en-US" sz="1200" b="0" i="1" smtClean="0">
+                            <a:latin typeface="Cambria Math" panose="02040503050406030204" pitchFamily="18" charset="0"/>
+                          </a:rPr>
+                          <m:t>𝑧</m:t>
+                        </m:r>
+                      </m:oMath>
+                    </m:oMathPara>
+                  </a14:m>
+                  <a:endParaRPr lang="en-IL" sz="1200" dirty="0"/>
+                </a:p>
+              </p:txBody>
+            </p:sp>
+          </mc:Choice>
+          <mc:Fallback>
+            <p:sp>
+              <p:nvSpPr>
+                <p:cNvPr id="36" name="Oval 35">
+                  <a:extLst>
+                    <a:ext uri="{FF2B5EF4-FFF2-40B4-BE49-F238E27FC236}">
+                      <a16:creationId xmlns:a16="http://schemas.microsoft.com/office/drawing/2014/main" id="{46FDFF81-C9FF-A469-E903-607AFB37B1D4}"/>
+                    </a:ext>
+                  </a:extLst>
+                </p:cNvPr>
+                <p:cNvSpPr>
+                  <a:spLocks noRot="1" noChangeAspect="1" noMove="1" noResize="1" noEditPoints="1" noAdjustHandles="1" noChangeArrowheads="1" noChangeShapeType="1" noTextEdit="1"/>
+                </p:cNvSpPr>
+                <p:nvPr/>
+              </p:nvSpPr>
+              <p:spPr>
+                <a:xfrm>
+                  <a:off x="5396510" y="4237206"/>
+                  <a:ext cx="360000" cy="360000"/>
+                </a:xfrm>
+                <a:prstGeom prst="ellipse">
+                  <a:avLst/>
+                </a:prstGeom>
+                <a:blipFill>
+                  <a:blip r:embed="rId9"/>
+                  <a:stretch>
+                    <a:fillRect/>
+                  </a:stretch>
+                </a:blipFill>
+              </p:spPr>
+              <p:txBody>
+                <a:bodyPr/>
+                <a:lstStyle/>
+                <a:p>
+                  <a:r>
+                    <a:rPr lang="en-IL">
+                      <a:noFill/>
+                    </a:rPr>
+                    <a:t> </a:t>
+                  </a:r>
+                </a:p>
+              </p:txBody>
+            </p:sp>
+          </mc:Fallback>
+        </mc:AlternateContent>
+        <p:cxnSp>
+          <p:nvCxnSpPr>
+            <p:cNvPr id="47" name="Straight Arrow Connector 46">
+              <a:extLst>
+                <a:ext uri="{FF2B5EF4-FFF2-40B4-BE49-F238E27FC236}">
+                  <a16:creationId xmlns:a16="http://schemas.microsoft.com/office/drawing/2014/main" id="{E40AC991-6795-3F0F-8543-6C19E1CA7A38}"/>
+                </a:ext>
+              </a:extLst>
+            </p:cNvPr>
+            <p:cNvCxnSpPr>
+              <a:cxnSpLocks/>
+              <a:stCxn id="14" idx="3"/>
+              <a:endCxn id="48" idx="0"/>
+            </p:cNvCxnSpPr>
+            <p:nvPr/>
+          </p:nvCxnSpPr>
+          <p:spPr>
+            <a:xfrm flipH="1">
+              <a:off x="4796913" y="4518660"/>
+              <a:ext cx="126843" cy="210961"/>
+            </a:xfrm>
+            <a:prstGeom prst="straightConnector1">
+              <a:avLst/>
+            </a:prstGeom>
+            <a:ln>
+              <a:tailEnd type="triangle"/>
+            </a:ln>
+          </p:spPr>
+          <p:style>
+            <a:lnRef idx="1">
+              <a:schemeClr val="accent1"/>
+            </a:lnRef>
+            <a:fillRef idx="0">
+              <a:schemeClr val="accent1"/>
+            </a:fillRef>
+            <a:effectRef idx="0">
+              <a:schemeClr val="accent1"/>
+            </a:effectRef>
+            <a:fontRef idx="minor">
+              <a:schemeClr val="tx1"/>
+            </a:fontRef>
+          </p:style>
+        </p:cxnSp>
+        <mc:AlternateContent xmlns:mc="http://schemas.openxmlformats.org/markup-compatibility/2006">
+          <mc:Choice xmlns:a14="http://schemas.microsoft.com/office/drawing/2010/main" Requires="a14">
+            <p:sp>
+              <p:nvSpPr>
+                <p:cNvPr id="48" name="Oval 47">
+                  <a:extLst>
+                    <a:ext uri="{FF2B5EF4-FFF2-40B4-BE49-F238E27FC236}">
+                      <a16:creationId xmlns:a16="http://schemas.microsoft.com/office/drawing/2014/main" id="{87AF6C40-F160-99FD-4E2D-ED7ED15DC1BC}"/>
+                    </a:ext>
+                  </a:extLst>
+                </p:cNvPr>
+                <p:cNvSpPr>
+                  <a:spLocks noChangeAspect="1"/>
+                </p:cNvSpPr>
+                <p:nvPr/>
+              </p:nvSpPr>
+              <p:spPr>
+                <a:xfrm>
+                  <a:off x="4616913" y="4729621"/>
+                  <a:ext cx="360000" cy="360000"/>
+                </a:xfrm>
+                <a:prstGeom prst="ellipse">
+                  <a:avLst/>
+                </a:prstGeom>
+              </p:spPr>
+              <p:style>
+                <a:lnRef idx="2">
+                  <a:schemeClr val="accent1">
+                    <a:shade val="50000"/>
+                  </a:schemeClr>
+                </a:lnRef>
+                <a:fillRef idx="1">
+                  <a:schemeClr val="accent1"/>
+                </a:fillRef>
+                <a:effectRef idx="0">
+                  <a:schemeClr val="accent1"/>
+                </a:effectRef>
+                <a:fontRef idx="minor">
+                  <a:schemeClr val="lt1"/>
+                </a:fontRef>
+              </p:style>
+              <p:txBody>
+                <a:bodyPr rtlCol="0" anchor="ctr"/>
+                <a:lstStyle/>
+                <a:p>
+                  <a:pPr algn="ctr"/>
+                  <a14:m>
+                    <m:oMathPara xmlns:m="http://schemas.openxmlformats.org/officeDocument/2006/math">
+                      <m:oMathParaPr>
+                        <m:jc m:val="centerGroup"/>
+                      </m:oMathParaPr>
+                      <m:oMath xmlns:m="http://schemas.openxmlformats.org/officeDocument/2006/math">
+                        <m:r>
+                          <a:rPr lang="en-US" sz="1200" b="0" i="1" smtClean="0">
+                            <a:latin typeface="Cambria Math" panose="02040503050406030204" pitchFamily="18" charset="0"/>
+                          </a:rPr>
+                          <m:t>𝑥</m:t>
+                        </m:r>
+                      </m:oMath>
+                    </m:oMathPara>
+                  </a14:m>
+                  <a:endParaRPr lang="en-IL" sz="1200" dirty="0"/>
+                </a:p>
+              </p:txBody>
+            </p:sp>
+          </mc:Choice>
+          <mc:Fallback>
+            <p:sp>
+              <p:nvSpPr>
+                <p:cNvPr id="48" name="Oval 47">
+                  <a:extLst>
+                    <a:ext uri="{FF2B5EF4-FFF2-40B4-BE49-F238E27FC236}">
+                      <a16:creationId xmlns:a16="http://schemas.microsoft.com/office/drawing/2014/main" id="{87AF6C40-F160-99FD-4E2D-ED7ED15DC1BC}"/>
+                    </a:ext>
+                  </a:extLst>
+                </p:cNvPr>
+                <p:cNvSpPr>
+                  <a:spLocks noRot="1" noChangeAspect="1" noMove="1" noResize="1" noEditPoints="1" noAdjustHandles="1" noChangeArrowheads="1" noChangeShapeType="1" noTextEdit="1"/>
+                </p:cNvSpPr>
+                <p:nvPr/>
+              </p:nvSpPr>
+              <p:spPr>
+                <a:xfrm>
+                  <a:off x="4616913" y="4729621"/>
+                  <a:ext cx="360000" cy="360000"/>
+                </a:xfrm>
+                <a:prstGeom prst="ellipse">
+                  <a:avLst/>
+                </a:prstGeom>
+                <a:blipFill>
+                  <a:blip r:embed="rId10"/>
+                  <a:stretch>
+                    <a:fillRect/>
+                  </a:stretch>
+                </a:blipFill>
+              </p:spPr>
+              <p:txBody>
+                <a:bodyPr/>
+                <a:lstStyle/>
+                <a:p>
+                  <a:r>
+                    <a:rPr lang="en-IL">
+                      <a:noFill/>
+                    </a:rPr>
+                    <a:t> </a:t>
+                  </a:r>
+                </a:p>
+              </p:txBody>
+            </p:sp>
+          </mc:Fallback>
+        </mc:AlternateContent>
+        <p:cxnSp>
+          <p:nvCxnSpPr>
+            <p:cNvPr id="49" name="Straight Arrow Connector 48">
+              <a:extLst>
+                <a:ext uri="{FF2B5EF4-FFF2-40B4-BE49-F238E27FC236}">
+                  <a16:creationId xmlns:a16="http://schemas.microsoft.com/office/drawing/2014/main" id="{ABBB6C4F-8C02-892F-2D12-798701F6B0A7}"/>
+                </a:ext>
+              </a:extLst>
+            </p:cNvPr>
+            <p:cNvCxnSpPr>
+              <a:cxnSpLocks/>
+              <a:stCxn id="14" idx="5"/>
+              <a:endCxn id="50" idx="0"/>
+            </p:cNvCxnSpPr>
+            <p:nvPr/>
+          </p:nvCxnSpPr>
+          <p:spPr>
+            <a:xfrm>
+              <a:off x="5178314" y="4518660"/>
+              <a:ext cx="154556" cy="207392"/>
+            </a:xfrm>
+            <a:prstGeom prst="straightConnector1">
+              <a:avLst/>
+            </a:prstGeom>
+            <a:ln>
+              <a:tailEnd type="triangle"/>
+            </a:ln>
+          </p:spPr>
+          <p:style>
+            <a:lnRef idx="1">
+              <a:schemeClr val="accent1"/>
+            </a:lnRef>
+            <a:fillRef idx="0">
+              <a:schemeClr val="accent1"/>
+            </a:fillRef>
+            <a:effectRef idx="0">
+              <a:schemeClr val="accent1"/>
+            </a:effectRef>
+            <a:fontRef idx="minor">
+              <a:schemeClr val="tx1"/>
+            </a:fontRef>
+          </p:style>
+        </p:cxnSp>
+        <mc:AlternateContent xmlns:mc="http://schemas.openxmlformats.org/markup-compatibility/2006">
+          <mc:Choice xmlns:a14="http://schemas.microsoft.com/office/drawing/2010/main" Requires="a14">
+            <p:sp>
+              <p:nvSpPr>
+                <p:cNvPr id="50" name="Oval 49">
+                  <a:extLst>
+                    <a:ext uri="{FF2B5EF4-FFF2-40B4-BE49-F238E27FC236}">
+                      <a16:creationId xmlns:a16="http://schemas.microsoft.com/office/drawing/2014/main" id="{E4CC31AC-2DED-0CDE-06AB-916EE16833E4}"/>
+                    </a:ext>
+                  </a:extLst>
+                </p:cNvPr>
+                <p:cNvSpPr>
+                  <a:spLocks noChangeAspect="1"/>
+                </p:cNvSpPr>
+                <p:nvPr/>
+              </p:nvSpPr>
+              <p:spPr>
+                <a:xfrm>
+                  <a:off x="5152870" y="4726052"/>
+                  <a:ext cx="360000" cy="360000"/>
+                </a:xfrm>
+                <a:prstGeom prst="ellipse">
+                  <a:avLst/>
+                </a:prstGeom>
+              </p:spPr>
+              <p:style>
+                <a:lnRef idx="2">
+                  <a:schemeClr val="accent1">
+                    <a:shade val="50000"/>
+                  </a:schemeClr>
+                </a:lnRef>
+                <a:fillRef idx="1">
+                  <a:schemeClr val="accent1"/>
+                </a:fillRef>
+                <a:effectRef idx="0">
+                  <a:schemeClr val="accent1"/>
+                </a:effectRef>
+                <a:fontRef idx="minor">
+                  <a:schemeClr val="lt1"/>
+                </a:fontRef>
+              </p:style>
+              <p:txBody>
+                <a:bodyPr rtlCol="0" anchor="ctr"/>
+                <a:lstStyle/>
+                <a:p>
+                  <a:pPr algn="ctr"/>
+                  <a14:m>
+                    <m:oMathPara xmlns:m="http://schemas.openxmlformats.org/officeDocument/2006/math">
+                      <m:oMathParaPr>
+                        <m:jc m:val="centerGroup"/>
+                      </m:oMathParaPr>
+                      <m:oMath xmlns:m="http://schemas.openxmlformats.org/officeDocument/2006/math">
+                        <m:r>
+                          <a:rPr lang="en-US" sz="1200" b="0" i="1" smtClean="0">
+                            <a:latin typeface="Cambria Math" panose="02040503050406030204" pitchFamily="18" charset="0"/>
+                          </a:rPr>
+                          <m:t>𝑦</m:t>
+                        </m:r>
+                      </m:oMath>
+                    </m:oMathPara>
+                  </a14:m>
+                  <a:endParaRPr lang="en-IL" sz="1200" dirty="0"/>
+                </a:p>
+              </p:txBody>
+            </p:sp>
+          </mc:Choice>
+          <mc:Fallback>
+            <p:sp>
+              <p:nvSpPr>
+                <p:cNvPr id="50" name="Oval 49">
+                  <a:extLst>
+                    <a:ext uri="{FF2B5EF4-FFF2-40B4-BE49-F238E27FC236}">
+                      <a16:creationId xmlns:a16="http://schemas.microsoft.com/office/drawing/2014/main" id="{E4CC31AC-2DED-0CDE-06AB-916EE16833E4}"/>
+                    </a:ext>
+                  </a:extLst>
+                </p:cNvPr>
+                <p:cNvSpPr>
+                  <a:spLocks noRot="1" noChangeAspect="1" noMove="1" noResize="1" noEditPoints="1" noAdjustHandles="1" noChangeArrowheads="1" noChangeShapeType="1" noTextEdit="1"/>
+                </p:cNvSpPr>
+                <p:nvPr/>
+              </p:nvSpPr>
+              <p:spPr>
+                <a:xfrm>
+                  <a:off x="5152870" y="4726052"/>
+                  <a:ext cx="360000" cy="360000"/>
+                </a:xfrm>
+                <a:prstGeom prst="ellipse">
+                  <a:avLst/>
+                </a:prstGeom>
+                <a:blipFill>
+                  <a:blip r:embed="rId11"/>
+                  <a:stretch>
+                    <a:fillRect/>
+                  </a:stretch>
+                </a:blipFill>
+              </p:spPr>
+              <p:txBody>
+                <a:bodyPr/>
+                <a:lstStyle/>
+                <a:p>
+                  <a:r>
+                    <a:rPr lang="en-IL">
+                      <a:noFill/>
+                    </a:rPr>
+                    <a:t> </a:t>
+                  </a:r>
+                </a:p>
+              </p:txBody>
+            </p:sp>
+          </mc:Fallback>
+        </mc:AlternateContent>
+        <p:cxnSp>
+          <p:nvCxnSpPr>
+            <p:cNvPr id="78" name="Straight Arrow Connector 77">
+              <a:extLst>
+                <a:ext uri="{FF2B5EF4-FFF2-40B4-BE49-F238E27FC236}">
+                  <a16:creationId xmlns:a16="http://schemas.microsoft.com/office/drawing/2014/main" id="{5472C5F0-03E7-E611-E4AF-E451ACA225A2}"/>
+                </a:ext>
+              </a:extLst>
+            </p:cNvPr>
+            <p:cNvCxnSpPr>
+              <a:cxnSpLocks/>
+              <a:stCxn id="21" idx="3"/>
+              <a:endCxn id="82" idx="0"/>
+            </p:cNvCxnSpPr>
+            <p:nvPr/>
+          </p:nvCxnSpPr>
+          <p:spPr>
+            <a:xfrm flipH="1">
+              <a:off x="3257037" y="4516742"/>
+              <a:ext cx="232721" cy="152163"/>
+            </a:xfrm>
+            <a:prstGeom prst="straightConnector1">
+              <a:avLst/>
+            </a:prstGeom>
+            <a:ln>
+              <a:tailEnd type="triangle"/>
+            </a:ln>
+          </p:spPr>
+          <p:style>
+            <a:lnRef idx="1">
+              <a:schemeClr val="accent1"/>
+            </a:lnRef>
+            <a:fillRef idx="0">
+              <a:schemeClr val="accent1"/>
+            </a:fillRef>
+            <a:effectRef idx="0">
+              <a:schemeClr val="accent1"/>
+            </a:effectRef>
+            <a:fontRef idx="minor">
+              <a:schemeClr val="tx1"/>
+            </a:fontRef>
+          </p:style>
+        </p:cxnSp>
+        <p:cxnSp>
+          <p:nvCxnSpPr>
+            <p:cNvPr id="80" name="Straight Arrow Connector 79">
+              <a:extLst>
+                <a:ext uri="{FF2B5EF4-FFF2-40B4-BE49-F238E27FC236}">
+                  <a16:creationId xmlns:a16="http://schemas.microsoft.com/office/drawing/2014/main" id="{AD24A0FE-8710-5095-4879-432CD9FE9DA3}"/>
+                </a:ext>
+              </a:extLst>
+            </p:cNvPr>
+            <p:cNvCxnSpPr>
+              <a:cxnSpLocks/>
+              <a:stCxn id="21" idx="5"/>
+              <a:endCxn id="81" idx="0"/>
+            </p:cNvCxnSpPr>
+            <p:nvPr/>
+          </p:nvCxnSpPr>
+          <p:spPr>
+            <a:xfrm>
+              <a:off x="3744316" y="4516742"/>
+              <a:ext cx="232721" cy="129481"/>
+            </a:xfrm>
+            <a:prstGeom prst="straightConnector1">
+              <a:avLst/>
+            </a:prstGeom>
+            <a:ln>
+              <a:tailEnd type="triangle"/>
+            </a:ln>
+          </p:spPr>
+          <p:style>
+            <a:lnRef idx="1">
+              <a:schemeClr val="accent1"/>
+            </a:lnRef>
+            <a:fillRef idx="0">
+              <a:schemeClr val="accent1"/>
+            </a:fillRef>
+            <a:effectRef idx="0">
+              <a:schemeClr val="accent1"/>
+            </a:effectRef>
+            <a:fontRef idx="minor">
+              <a:schemeClr val="tx1"/>
+            </a:fontRef>
+          </p:style>
+        </p:cxnSp>
+        <mc:AlternateContent xmlns:mc="http://schemas.openxmlformats.org/markup-compatibility/2006">
+          <mc:Choice xmlns:a14="http://schemas.microsoft.com/office/drawing/2010/main" Requires="a14">
+            <p:sp>
+              <p:nvSpPr>
+                <p:cNvPr id="81" name="Oval 80">
+                  <a:extLst>
+                    <a:ext uri="{FF2B5EF4-FFF2-40B4-BE49-F238E27FC236}">
+                      <a16:creationId xmlns:a16="http://schemas.microsoft.com/office/drawing/2014/main" id="{19E995AC-2937-6C57-67D9-15589D998A06}"/>
+                    </a:ext>
+                  </a:extLst>
+                </p:cNvPr>
+                <p:cNvSpPr>
+                  <a:spLocks noChangeAspect="1"/>
+                </p:cNvSpPr>
+                <p:nvPr/>
+              </p:nvSpPr>
+              <p:spPr>
+                <a:xfrm>
+                  <a:off x="3797037" y="4646223"/>
+                  <a:ext cx="360000" cy="360000"/>
+                </a:xfrm>
+                <a:prstGeom prst="ellipse">
+                  <a:avLst/>
+                </a:prstGeom>
+              </p:spPr>
+              <p:style>
+                <a:lnRef idx="2">
+                  <a:schemeClr val="accent1">
+                    <a:shade val="50000"/>
+                  </a:schemeClr>
+                </a:lnRef>
+                <a:fillRef idx="1">
+                  <a:schemeClr val="accent1"/>
+                </a:fillRef>
+                <a:effectRef idx="0">
+                  <a:schemeClr val="accent1"/>
+                </a:effectRef>
+                <a:fontRef idx="minor">
+                  <a:schemeClr val="lt1"/>
+                </a:fontRef>
+              </p:style>
+              <p:txBody>
+                <a:bodyPr rtlCol="0" anchor="ctr"/>
+                <a:lstStyle/>
+                <a:p>
+                  <a:pPr algn="ctr"/>
+                  <a14:m>
+                    <m:oMathPara xmlns:m="http://schemas.openxmlformats.org/officeDocument/2006/math">
+                      <m:oMathParaPr>
+                        <m:jc m:val="centerGroup"/>
+                      </m:oMathParaPr>
+                      <m:oMath xmlns:m="http://schemas.openxmlformats.org/officeDocument/2006/math">
+                        <m:r>
+                          <a:rPr lang="en-US" sz="1200" b="0" i="1" smtClean="0">
+                            <a:latin typeface="Cambria Math" panose="02040503050406030204" pitchFamily="18" charset="0"/>
+                          </a:rPr>
+                          <m:t>𝑑</m:t>
+                        </m:r>
+                      </m:oMath>
+                    </m:oMathPara>
+                  </a14:m>
+                  <a:endParaRPr lang="en-IL" sz="1200" dirty="0"/>
+                </a:p>
+              </p:txBody>
+            </p:sp>
+          </mc:Choice>
+          <mc:Fallback>
+            <p:sp>
+              <p:nvSpPr>
+                <p:cNvPr id="81" name="Oval 80">
+                  <a:extLst>
+                    <a:ext uri="{FF2B5EF4-FFF2-40B4-BE49-F238E27FC236}">
+                      <a16:creationId xmlns:a16="http://schemas.microsoft.com/office/drawing/2014/main" id="{19E995AC-2937-6C57-67D9-15589D998A06}"/>
+                    </a:ext>
+                  </a:extLst>
+                </p:cNvPr>
+                <p:cNvSpPr>
+                  <a:spLocks noRot="1" noChangeAspect="1" noMove="1" noResize="1" noEditPoints="1" noAdjustHandles="1" noChangeArrowheads="1" noChangeShapeType="1" noTextEdit="1"/>
+                </p:cNvSpPr>
+                <p:nvPr/>
+              </p:nvSpPr>
+              <p:spPr>
+                <a:xfrm>
+                  <a:off x="3797037" y="4646223"/>
+                  <a:ext cx="360000" cy="360000"/>
+                </a:xfrm>
+                <a:prstGeom prst="ellipse">
+                  <a:avLst/>
+                </a:prstGeom>
+                <a:blipFill>
+                  <a:blip r:embed="rId12"/>
+                  <a:stretch>
+                    <a:fillRect/>
+                  </a:stretch>
+                </a:blipFill>
+              </p:spPr>
+              <p:txBody>
+                <a:bodyPr/>
+                <a:lstStyle/>
+                <a:p>
+                  <a:r>
+                    <a:rPr lang="en-IL">
+                      <a:noFill/>
+                    </a:rPr>
+                    <a:t> </a:t>
+                  </a:r>
+                </a:p>
+              </p:txBody>
+            </p:sp>
+          </mc:Fallback>
+        </mc:AlternateContent>
+        <mc:AlternateContent xmlns:mc="http://schemas.openxmlformats.org/markup-compatibility/2006">
+          <mc:Choice xmlns:a14="http://schemas.microsoft.com/office/drawing/2010/main" Requires="a14">
+            <p:sp>
+              <p:nvSpPr>
+                <p:cNvPr id="82" name="Oval 81">
+                  <a:extLst>
+                    <a:ext uri="{FF2B5EF4-FFF2-40B4-BE49-F238E27FC236}">
+                      <a16:creationId xmlns:a16="http://schemas.microsoft.com/office/drawing/2014/main" id="{D144479D-52AF-DBD7-D369-72275CE3C33A}"/>
+                    </a:ext>
+                  </a:extLst>
+                </p:cNvPr>
+                <p:cNvSpPr>
+                  <a:spLocks noChangeAspect="1"/>
+                </p:cNvSpPr>
+                <p:nvPr/>
+              </p:nvSpPr>
+              <p:spPr>
+                <a:xfrm>
+                  <a:off x="3077037" y="4668905"/>
+                  <a:ext cx="360000" cy="360000"/>
+                </a:xfrm>
+                <a:prstGeom prst="ellipse">
+                  <a:avLst/>
+                </a:prstGeom>
+              </p:spPr>
+              <p:style>
+                <a:lnRef idx="2">
+                  <a:schemeClr val="accent1">
+                    <a:shade val="50000"/>
+                  </a:schemeClr>
+                </a:lnRef>
+                <a:fillRef idx="1">
+                  <a:schemeClr val="accent1"/>
+                </a:fillRef>
+                <a:effectRef idx="0">
+                  <a:schemeClr val="accent1"/>
+                </a:effectRef>
+                <a:fontRef idx="minor">
+                  <a:schemeClr val="lt1"/>
+                </a:fontRef>
+              </p:style>
+              <p:txBody>
+                <a:bodyPr rtlCol="0" anchor="ctr"/>
+                <a:lstStyle/>
+                <a:p>
+                  <a:pPr algn="ctr"/>
+                  <a14:m>
+                    <m:oMathPara xmlns:m="http://schemas.openxmlformats.org/officeDocument/2006/math">
+                      <m:oMathParaPr>
+                        <m:jc m:val="centerGroup"/>
+                      </m:oMathParaPr>
+                      <m:oMath xmlns:m="http://schemas.openxmlformats.org/officeDocument/2006/math">
+                        <m:r>
+                          <a:rPr lang="en-US" sz="1200" b="0" i="1" smtClean="0">
+                            <a:latin typeface="Cambria Math" panose="02040503050406030204" pitchFamily="18" charset="0"/>
+                          </a:rPr>
+                          <m:t>+</m:t>
+                        </m:r>
+                      </m:oMath>
+                    </m:oMathPara>
+                  </a14:m>
+                  <a:endParaRPr lang="en-IL" sz="1200" dirty="0"/>
+                </a:p>
+              </p:txBody>
+            </p:sp>
+          </mc:Choice>
+          <mc:Fallback>
+            <p:sp>
+              <p:nvSpPr>
+                <p:cNvPr id="82" name="Oval 81">
+                  <a:extLst>
+                    <a:ext uri="{FF2B5EF4-FFF2-40B4-BE49-F238E27FC236}">
+                      <a16:creationId xmlns:a16="http://schemas.microsoft.com/office/drawing/2014/main" id="{D144479D-52AF-DBD7-D369-72275CE3C33A}"/>
+                    </a:ext>
+                  </a:extLst>
+                </p:cNvPr>
+                <p:cNvSpPr>
+                  <a:spLocks noRot="1" noChangeAspect="1" noMove="1" noResize="1" noEditPoints="1" noAdjustHandles="1" noChangeArrowheads="1" noChangeShapeType="1" noTextEdit="1"/>
+                </p:cNvSpPr>
+                <p:nvPr/>
+              </p:nvSpPr>
+              <p:spPr>
+                <a:xfrm>
+                  <a:off x="3077037" y="4668905"/>
+                  <a:ext cx="360000" cy="360000"/>
+                </a:xfrm>
+                <a:prstGeom prst="ellipse">
+                  <a:avLst/>
+                </a:prstGeom>
+                <a:blipFill>
+                  <a:blip r:embed="rId13"/>
+                  <a:stretch>
+                    <a:fillRect/>
+                  </a:stretch>
+                </a:blipFill>
+              </p:spPr>
+              <p:txBody>
+                <a:bodyPr/>
+                <a:lstStyle/>
+                <a:p>
+                  <a:r>
+                    <a:rPr lang="en-IL">
+                      <a:noFill/>
+                    </a:rPr>
+                    <a:t> </a:t>
+                  </a:r>
+                </a:p>
+              </p:txBody>
+            </p:sp>
+          </mc:Fallback>
+        </mc:AlternateContent>
+        <p:cxnSp>
+          <p:nvCxnSpPr>
+            <p:cNvPr id="87" name="Straight Arrow Connector 86">
+              <a:extLst>
+                <a:ext uri="{FF2B5EF4-FFF2-40B4-BE49-F238E27FC236}">
+                  <a16:creationId xmlns:a16="http://schemas.microsoft.com/office/drawing/2014/main" id="{4C9FE282-1453-9933-40FC-FE43FDC679E8}"/>
+                </a:ext>
+              </a:extLst>
+            </p:cNvPr>
+            <p:cNvCxnSpPr>
+              <a:cxnSpLocks/>
+              <a:stCxn id="82" idx="3"/>
+              <a:endCxn id="90" idx="0"/>
+            </p:cNvCxnSpPr>
+            <p:nvPr/>
+          </p:nvCxnSpPr>
+          <p:spPr>
+            <a:xfrm flipH="1">
+              <a:off x="2905385" y="4976184"/>
+              <a:ext cx="224373" cy="138828"/>
+            </a:xfrm>
+            <a:prstGeom prst="straightConnector1">
+              <a:avLst/>
+            </a:prstGeom>
+            <a:ln>
+              <a:tailEnd type="triangle"/>
+            </a:ln>
+          </p:spPr>
+          <p:style>
+            <a:lnRef idx="1">
+              <a:schemeClr val="accent1"/>
+            </a:lnRef>
+            <a:fillRef idx="0">
+              <a:schemeClr val="accent1"/>
+            </a:fillRef>
+            <a:effectRef idx="0">
+              <a:schemeClr val="accent1"/>
+            </a:effectRef>
+            <a:fontRef idx="minor">
+              <a:schemeClr val="tx1"/>
+            </a:fontRef>
+          </p:style>
+        </p:cxnSp>
+        <p:cxnSp>
+          <p:nvCxnSpPr>
+            <p:cNvPr id="88" name="Straight Arrow Connector 87">
+              <a:extLst>
+                <a:ext uri="{FF2B5EF4-FFF2-40B4-BE49-F238E27FC236}">
+                  <a16:creationId xmlns:a16="http://schemas.microsoft.com/office/drawing/2014/main" id="{D022D1D5-6CEF-5BE1-F8A1-4A26451B951E}"/>
+                </a:ext>
+              </a:extLst>
+            </p:cNvPr>
+            <p:cNvCxnSpPr>
+              <a:cxnSpLocks/>
+              <a:stCxn id="82" idx="5"/>
+              <a:endCxn id="89" idx="0"/>
+            </p:cNvCxnSpPr>
+            <p:nvPr/>
+          </p:nvCxnSpPr>
+          <p:spPr>
+            <a:xfrm>
+              <a:off x="3384316" y="4976184"/>
+              <a:ext cx="160360" cy="138828"/>
+            </a:xfrm>
+            <a:prstGeom prst="straightConnector1">
+              <a:avLst/>
+            </a:prstGeom>
+            <a:ln>
+              <a:tailEnd type="triangle"/>
+            </a:ln>
+          </p:spPr>
+          <p:style>
+            <a:lnRef idx="1">
+              <a:schemeClr val="accent1"/>
+            </a:lnRef>
+            <a:fillRef idx="0">
+              <a:schemeClr val="accent1"/>
+            </a:fillRef>
+            <a:effectRef idx="0">
+              <a:schemeClr val="accent1"/>
+            </a:effectRef>
+            <a:fontRef idx="minor">
+              <a:schemeClr val="tx1"/>
+            </a:fontRef>
+          </p:style>
+        </p:cxnSp>
+        <mc:AlternateContent xmlns:mc="http://schemas.openxmlformats.org/markup-compatibility/2006">
+          <mc:Choice xmlns:a14="http://schemas.microsoft.com/office/drawing/2010/main" Requires="a14">
+            <p:sp>
+              <p:nvSpPr>
+                <p:cNvPr id="89" name="Oval 88">
+                  <a:extLst>
+                    <a:ext uri="{FF2B5EF4-FFF2-40B4-BE49-F238E27FC236}">
+                      <a16:creationId xmlns:a16="http://schemas.microsoft.com/office/drawing/2014/main" id="{3EF9B759-3855-2BCA-7078-B79C0E045D85}"/>
+                    </a:ext>
+                  </a:extLst>
+                </p:cNvPr>
+                <p:cNvSpPr>
+                  <a:spLocks noChangeAspect="1"/>
+                </p:cNvSpPr>
+                <p:nvPr/>
+              </p:nvSpPr>
+              <p:spPr>
+                <a:xfrm>
+                  <a:off x="3364676" y="5115012"/>
+                  <a:ext cx="360000" cy="360000"/>
+                </a:xfrm>
+                <a:prstGeom prst="ellipse">
+                  <a:avLst/>
+                </a:prstGeom>
+              </p:spPr>
+              <p:style>
+                <a:lnRef idx="2">
+                  <a:schemeClr val="accent1">
+                    <a:shade val="50000"/>
+                  </a:schemeClr>
+                </a:lnRef>
+                <a:fillRef idx="1">
+                  <a:schemeClr val="accent1"/>
+                </a:fillRef>
+                <a:effectRef idx="0">
+                  <a:schemeClr val="accent1"/>
+                </a:effectRef>
+                <a:fontRef idx="minor">
+                  <a:schemeClr val="lt1"/>
+                </a:fontRef>
+              </p:style>
+              <p:txBody>
+                <a:bodyPr rtlCol="0" anchor="ctr"/>
+                <a:lstStyle/>
+                <a:p>
+                  <a:pPr algn="ctr"/>
+                  <a14:m>
+                    <m:oMathPara xmlns:m="http://schemas.openxmlformats.org/officeDocument/2006/math">
+                      <m:oMathParaPr>
+                        <m:jc m:val="centerGroup"/>
+                      </m:oMathParaPr>
+                      <m:oMath xmlns:m="http://schemas.openxmlformats.org/officeDocument/2006/math">
+                        <m:r>
+                          <a:rPr lang="en-US" sz="1200" b="0" i="1" smtClean="0">
+                            <a:latin typeface="Cambria Math" panose="02040503050406030204" pitchFamily="18" charset="0"/>
+                          </a:rPr>
+                          <m:t>𝑐</m:t>
+                        </m:r>
+                      </m:oMath>
+                    </m:oMathPara>
+                  </a14:m>
+                  <a:endParaRPr lang="en-IL" sz="1200" dirty="0"/>
+                </a:p>
+              </p:txBody>
+            </p:sp>
+          </mc:Choice>
+          <mc:Fallback>
+            <p:sp>
+              <p:nvSpPr>
+                <p:cNvPr id="89" name="Oval 88">
+                  <a:extLst>
+                    <a:ext uri="{FF2B5EF4-FFF2-40B4-BE49-F238E27FC236}">
+                      <a16:creationId xmlns:a16="http://schemas.microsoft.com/office/drawing/2014/main" id="{3EF9B759-3855-2BCA-7078-B79C0E045D85}"/>
+                    </a:ext>
+                  </a:extLst>
+                </p:cNvPr>
+                <p:cNvSpPr>
+                  <a:spLocks noRot="1" noChangeAspect="1" noMove="1" noResize="1" noEditPoints="1" noAdjustHandles="1" noChangeArrowheads="1" noChangeShapeType="1" noTextEdit="1"/>
+                </p:cNvSpPr>
+                <p:nvPr/>
+              </p:nvSpPr>
+              <p:spPr>
+                <a:xfrm>
+                  <a:off x="3364676" y="5115012"/>
+                  <a:ext cx="360000" cy="360000"/>
+                </a:xfrm>
+                <a:prstGeom prst="ellipse">
+                  <a:avLst/>
+                </a:prstGeom>
+                <a:blipFill>
+                  <a:blip r:embed="rId14"/>
+                  <a:stretch>
+                    <a:fillRect/>
+                  </a:stretch>
+                </a:blipFill>
+              </p:spPr>
+              <p:txBody>
+                <a:bodyPr/>
+                <a:lstStyle/>
+                <a:p>
+                  <a:r>
+                    <a:rPr lang="en-IL">
+                      <a:noFill/>
+                    </a:rPr>
+                    <a:t> </a:t>
+                  </a:r>
+                </a:p>
+              </p:txBody>
+            </p:sp>
+          </mc:Fallback>
+        </mc:AlternateContent>
+        <mc:AlternateContent xmlns:mc="http://schemas.openxmlformats.org/markup-compatibility/2006">
+          <mc:Choice xmlns:a14="http://schemas.microsoft.com/office/drawing/2010/main" Requires="a14">
+            <p:sp>
+              <p:nvSpPr>
+                <p:cNvPr id="90" name="Oval 89">
+                  <a:extLst>
+                    <a:ext uri="{FF2B5EF4-FFF2-40B4-BE49-F238E27FC236}">
+                      <a16:creationId xmlns:a16="http://schemas.microsoft.com/office/drawing/2014/main" id="{DE780ECB-56EE-A47E-10DC-5D02E398CDAE}"/>
+                    </a:ext>
+                  </a:extLst>
+                </p:cNvPr>
+                <p:cNvSpPr>
+                  <a:spLocks noChangeAspect="1"/>
+                </p:cNvSpPr>
+                <p:nvPr/>
+              </p:nvSpPr>
+              <p:spPr>
+                <a:xfrm>
+                  <a:off x="2725385" y="5115012"/>
+                  <a:ext cx="360000" cy="360000"/>
+                </a:xfrm>
+                <a:prstGeom prst="ellipse">
+                  <a:avLst/>
+                </a:prstGeom>
+              </p:spPr>
+              <p:style>
+                <a:lnRef idx="2">
+                  <a:schemeClr val="accent1">
+                    <a:shade val="50000"/>
+                  </a:schemeClr>
+                </a:lnRef>
+                <a:fillRef idx="1">
+                  <a:schemeClr val="accent1"/>
+                </a:fillRef>
+                <a:effectRef idx="0">
+                  <a:schemeClr val="accent1"/>
+                </a:effectRef>
+                <a:fontRef idx="minor">
+                  <a:schemeClr val="lt1"/>
+                </a:fontRef>
+              </p:style>
+              <p:txBody>
+                <a:bodyPr rtlCol="0" anchor="ctr"/>
+                <a:lstStyle/>
+                <a:p>
+                  <a:pPr algn="ctr"/>
+                  <a14:m>
+                    <m:oMathPara xmlns:m="http://schemas.openxmlformats.org/officeDocument/2006/math">
+                      <m:oMathParaPr>
+                        <m:jc m:val="centerGroup"/>
+                      </m:oMathParaPr>
+                      <m:oMath xmlns:m="http://schemas.openxmlformats.org/officeDocument/2006/math">
+                        <m:r>
+                          <a:rPr lang="en-US" sz="1200" b="0" i="1" smtClean="0">
+                            <a:latin typeface="Cambria Math" panose="02040503050406030204" pitchFamily="18" charset="0"/>
+                          </a:rPr>
+                          <m:t>𝑏</m:t>
+                        </m:r>
+                      </m:oMath>
+                    </m:oMathPara>
+                  </a14:m>
+                  <a:endParaRPr lang="en-IL" sz="1200" dirty="0"/>
+                </a:p>
+              </p:txBody>
+            </p:sp>
+          </mc:Choice>
+          <mc:Fallback>
+            <p:sp>
+              <p:nvSpPr>
+                <p:cNvPr id="90" name="Oval 89">
+                  <a:extLst>
+                    <a:ext uri="{FF2B5EF4-FFF2-40B4-BE49-F238E27FC236}">
+                      <a16:creationId xmlns:a16="http://schemas.microsoft.com/office/drawing/2014/main" id="{DE780ECB-56EE-A47E-10DC-5D02E398CDAE}"/>
+                    </a:ext>
+                  </a:extLst>
+                </p:cNvPr>
+                <p:cNvSpPr>
+                  <a:spLocks noRot="1" noChangeAspect="1" noMove="1" noResize="1" noEditPoints="1" noAdjustHandles="1" noChangeArrowheads="1" noChangeShapeType="1" noTextEdit="1"/>
+                </p:cNvSpPr>
+                <p:nvPr/>
+              </p:nvSpPr>
+              <p:spPr>
+                <a:xfrm>
+                  <a:off x="2725385" y="5115012"/>
+                  <a:ext cx="360000" cy="360000"/>
+                </a:xfrm>
+                <a:prstGeom prst="ellipse">
+                  <a:avLst/>
+                </a:prstGeom>
+                <a:blipFill>
+                  <a:blip r:embed="rId15"/>
+                  <a:stretch>
+                    <a:fillRect/>
+                  </a:stretch>
+                </a:blipFill>
+              </p:spPr>
+              <p:txBody>
+                <a:bodyPr/>
+                <a:lstStyle/>
+                <a:p>
+                  <a:r>
+                    <a:rPr lang="en-IL">
+                      <a:noFill/>
+                    </a:rPr>
+                    <a:t> </a:t>
+                  </a:r>
+                </a:p>
+              </p:txBody>
+            </p:sp>
+          </mc:Fallback>
+        </mc:AlternateContent>
+      </p:grpSp>
+    </p:spTree>
+    <p:extLst>
+      <p:ext uri="{BB962C8B-B14F-4D97-AF65-F5344CB8AC3E}">
+        <p14:creationId xmlns:p14="http://schemas.microsoft.com/office/powerpoint/2010/main" val="1170519986"/>
+      </p:ext>
+    </p:extLst>
+  </p:cSld>
+  <p:clrMapOvr>
+    <a:masterClrMapping/>
+  </p:clrMapOvr>
+</p:sld>
+</file>
+
+<file path=ppt/slides/slide5.xml><?xml version="1.0" encoding="utf-8"?>
+<p:sld xmlns:a="http://schemas.openxmlformats.org/drawingml/2006/main" xmlns:r="http://schemas.openxmlformats.org/officeDocument/2006/relationships" xmlns:p="http://schemas.openxmlformats.org/presentationml/2006/main">
+  <p:cSld>
+    <p:spTree>
+      <p:nvGrpSpPr>
+        <p:cNvPr id="1" name=""/>
+        <p:cNvGrpSpPr/>
+        <p:nvPr/>
+      </p:nvGrpSpPr>
+      <p:grpSpPr>
+        <a:xfrm>
+          <a:off x="0" y="0"/>
+          <a:ext cx="0" cy="0"/>
+          <a:chOff x="0" y="0"/>
+          <a:chExt cx="0" cy="0"/>
+        </a:xfrm>
+      </p:grpSpPr>
+      <p:grpSp>
+        <p:nvGrpSpPr>
+          <p:cNvPr id="48" name="Group 47">
+            <a:extLst>
+              <a:ext uri="{FF2B5EF4-FFF2-40B4-BE49-F238E27FC236}">
+                <a16:creationId xmlns:a16="http://schemas.microsoft.com/office/drawing/2014/main" id="{A7B19EE1-E059-7E33-B6B6-B61A776A726B}"/>
+              </a:ext>
+            </a:extLst>
+          </p:cNvPr>
+          <p:cNvGrpSpPr/>
+          <p:nvPr/>
+        </p:nvGrpSpPr>
+        <p:grpSpPr>
+          <a:xfrm>
+            <a:off x="4074160" y="2941320"/>
+            <a:ext cx="1092700" cy="2536805"/>
+            <a:chOff x="4074160" y="2941320"/>
+            <a:chExt cx="1092700" cy="2536805"/>
+          </a:xfrm>
+        </p:grpSpPr>
+        <p:sp>
+          <p:nvSpPr>
+            <p:cNvPr id="15" name="Rectangle 14">
+              <a:extLst>
+                <a:ext uri="{FF2B5EF4-FFF2-40B4-BE49-F238E27FC236}">
+                  <a16:creationId xmlns:a16="http://schemas.microsoft.com/office/drawing/2014/main" id="{37447DE1-FC1C-17C0-655C-D3B034E2122F}"/>
+                </a:ext>
+              </a:extLst>
+            </p:cNvPr>
+            <p:cNvSpPr/>
+            <p:nvPr/>
+          </p:nvSpPr>
+          <p:spPr>
+            <a:xfrm>
+              <a:off x="4074160" y="2941320"/>
+              <a:ext cx="1080000" cy="360000"/>
+            </a:xfrm>
+            <a:prstGeom prst="rect">
+              <a:avLst/>
+            </a:prstGeom>
+          </p:spPr>
+          <p:style>
+            <a:lnRef idx="2">
+              <a:schemeClr val="accent1">
+                <a:shade val="50000"/>
+              </a:schemeClr>
+            </a:lnRef>
+            <a:fillRef idx="1">
+              <a:schemeClr val="accent1"/>
+            </a:fillRef>
+            <a:effectRef idx="0">
+              <a:schemeClr val="accent1"/>
+            </a:effectRef>
+            <a:fontRef idx="minor">
+              <a:schemeClr val="lt1"/>
+            </a:fontRef>
+          </p:style>
+          <p:txBody>
+            <a:bodyPr rtlCol="0" anchor="ctr"/>
+            <a:lstStyle/>
+            <a:p>
+              <a:pPr algn="ctr"/>
+              <a:r>
+                <a:rPr lang="en-IL" sz="1200" dirty="0"/>
+                <a:t>main</a:t>
+              </a:r>
+            </a:p>
+          </p:txBody>
+        </p:sp>
+        <p:sp>
+          <p:nvSpPr>
+            <p:cNvPr id="16" name="Rectangle 15">
+              <a:extLst>
+                <a:ext uri="{FF2B5EF4-FFF2-40B4-BE49-F238E27FC236}">
+                  <a16:creationId xmlns:a16="http://schemas.microsoft.com/office/drawing/2014/main" id="{623C0750-E0C7-498A-8F88-CCAEA10650D9}"/>
+                </a:ext>
+              </a:extLst>
+            </p:cNvPr>
+            <p:cNvSpPr/>
+            <p:nvPr/>
+          </p:nvSpPr>
+          <p:spPr>
+            <a:xfrm>
+              <a:off x="4074160" y="3376681"/>
+              <a:ext cx="1080000" cy="360000"/>
+            </a:xfrm>
+            <a:prstGeom prst="rect">
+              <a:avLst/>
+            </a:prstGeom>
+          </p:spPr>
+          <p:style>
+            <a:lnRef idx="2">
+              <a:schemeClr val="accent1">
+                <a:shade val="50000"/>
+              </a:schemeClr>
+            </a:lnRef>
+            <a:fillRef idx="1">
+              <a:schemeClr val="accent1"/>
+            </a:fillRef>
+            <a:effectRef idx="0">
+              <a:schemeClr val="accent1"/>
+            </a:effectRef>
+            <a:fontRef idx="minor">
+              <a:schemeClr val="lt1"/>
+            </a:fontRef>
+          </p:style>
+          <p:txBody>
+            <a:bodyPr rtlCol="0" anchor="ctr"/>
+            <a:lstStyle/>
+            <a:p>
+              <a:pPr algn="ctr"/>
+              <a:r>
+                <a:rPr lang="en-IL" sz="1200" dirty="0"/>
+                <a:t>f</a:t>
+              </a:r>
+            </a:p>
+          </p:txBody>
+        </p:sp>
+        <p:sp>
+          <p:nvSpPr>
+            <p:cNvPr id="17" name="Rectangle 16">
+              <a:extLst>
+                <a:ext uri="{FF2B5EF4-FFF2-40B4-BE49-F238E27FC236}">
+                  <a16:creationId xmlns:a16="http://schemas.microsoft.com/office/drawing/2014/main" id="{4F7B5F3F-39B1-93E6-5F21-5340A595842F}"/>
+                </a:ext>
+              </a:extLst>
+            </p:cNvPr>
+            <p:cNvSpPr/>
+            <p:nvPr/>
+          </p:nvSpPr>
+          <p:spPr>
+            <a:xfrm>
+              <a:off x="4074160" y="3812042"/>
+              <a:ext cx="1080000" cy="360000"/>
+            </a:xfrm>
+            <a:prstGeom prst="rect">
+              <a:avLst/>
+            </a:prstGeom>
+          </p:spPr>
+          <p:style>
+            <a:lnRef idx="2">
+              <a:schemeClr val="accent1">
+                <a:shade val="50000"/>
+              </a:schemeClr>
+            </a:lnRef>
+            <a:fillRef idx="1">
+              <a:schemeClr val="accent1"/>
+            </a:fillRef>
+            <a:effectRef idx="0">
+              <a:schemeClr val="accent1"/>
+            </a:effectRef>
+            <a:fontRef idx="minor">
+              <a:schemeClr val="lt1"/>
+            </a:fontRef>
+          </p:style>
+          <p:txBody>
+            <a:bodyPr rtlCol="0" anchor="ctr"/>
+            <a:lstStyle/>
+            <a:p>
+              <a:pPr algn="ctr"/>
+              <a:r>
+                <a:rPr lang="en-IL" sz="1200" dirty="0"/>
+                <a:t>r</a:t>
+              </a:r>
+            </a:p>
+          </p:txBody>
+        </p:sp>
+        <p:sp>
+          <p:nvSpPr>
+            <p:cNvPr id="18" name="Rectangle 17">
+              <a:extLst>
+                <a:ext uri="{FF2B5EF4-FFF2-40B4-BE49-F238E27FC236}">
+                  <a16:creationId xmlns:a16="http://schemas.microsoft.com/office/drawing/2014/main" id="{D2CE2014-C00D-3122-B8B0-EA713D960349}"/>
+                </a:ext>
+              </a:extLst>
+            </p:cNvPr>
+            <p:cNvSpPr/>
+            <p:nvPr/>
+          </p:nvSpPr>
+          <p:spPr>
+            <a:xfrm>
+              <a:off x="4074160" y="4247403"/>
+              <a:ext cx="1080000" cy="360000"/>
+            </a:xfrm>
+            <a:prstGeom prst="rect">
+              <a:avLst/>
+            </a:prstGeom>
+          </p:spPr>
+          <p:style>
+            <a:lnRef idx="2">
+              <a:schemeClr val="accent1">
+                <a:shade val="50000"/>
+              </a:schemeClr>
+            </a:lnRef>
+            <a:fillRef idx="1">
+              <a:schemeClr val="accent1"/>
+            </a:fillRef>
+            <a:effectRef idx="0">
+              <a:schemeClr val="accent1"/>
+            </a:effectRef>
+            <a:fontRef idx="minor">
+              <a:schemeClr val="lt1"/>
+            </a:fontRef>
+          </p:style>
+          <p:txBody>
+            <a:bodyPr rtlCol="0" anchor="ctr"/>
+            <a:lstStyle/>
+            <a:p>
+              <a:pPr algn="ctr"/>
+              <a:r>
+                <a:rPr lang="en-IL" sz="1200" dirty="0"/>
+                <a:t>f</a:t>
+              </a:r>
+            </a:p>
+          </p:txBody>
+        </p:sp>
+        <p:sp>
+          <p:nvSpPr>
+            <p:cNvPr id="19" name="Rectangle 18">
+              <a:extLst>
+                <a:ext uri="{FF2B5EF4-FFF2-40B4-BE49-F238E27FC236}">
+                  <a16:creationId xmlns:a16="http://schemas.microsoft.com/office/drawing/2014/main" id="{AD2A032F-666B-2173-7E04-02189ABED3EF}"/>
+                </a:ext>
+              </a:extLst>
+            </p:cNvPr>
+            <p:cNvSpPr/>
+            <p:nvPr/>
+          </p:nvSpPr>
+          <p:spPr>
+            <a:xfrm>
+              <a:off x="4074160" y="4682764"/>
+              <a:ext cx="1080000" cy="360000"/>
+            </a:xfrm>
+            <a:prstGeom prst="rect">
+              <a:avLst/>
+            </a:prstGeom>
+          </p:spPr>
+          <p:style>
+            <a:lnRef idx="2">
+              <a:schemeClr val="accent1">
+                <a:shade val="50000"/>
+              </a:schemeClr>
+            </a:lnRef>
+            <a:fillRef idx="1">
+              <a:schemeClr val="accent1"/>
+            </a:fillRef>
+            <a:effectRef idx="0">
+              <a:schemeClr val="accent1"/>
+            </a:effectRef>
+            <a:fontRef idx="minor">
+              <a:schemeClr val="lt1"/>
+            </a:fontRef>
+          </p:style>
+          <p:txBody>
+            <a:bodyPr rtlCol="0" anchor="ctr"/>
+            <a:lstStyle/>
+            <a:p>
+              <a:pPr algn="ctr"/>
+              <a:r>
+                <a:rPr lang="en-IL" sz="1200" dirty="0"/>
+                <a:t>foo</a:t>
+              </a:r>
+            </a:p>
+          </p:txBody>
+        </p:sp>
+        <p:sp>
+          <p:nvSpPr>
+            <p:cNvPr id="20" name="Rectangle 19">
+              <a:extLst>
+                <a:ext uri="{FF2B5EF4-FFF2-40B4-BE49-F238E27FC236}">
+                  <a16:creationId xmlns:a16="http://schemas.microsoft.com/office/drawing/2014/main" id="{8BD5620E-8BEF-8A58-6471-D2F534060E2E}"/>
+                </a:ext>
+              </a:extLst>
+            </p:cNvPr>
+            <p:cNvSpPr/>
+            <p:nvPr/>
+          </p:nvSpPr>
+          <p:spPr>
+            <a:xfrm>
+              <a:off x="4074160" y="5118125"/>
+              <a:ext cx="1080000" cy="360000"/>
+            </a:xfrm>
+            <a:prstGeom prst="rect">
+              <a:avLst/>
+            </a:prstGeom>
+          </p:spPr>
+          <p:style>
+            <a:lnRef idx="2">
+              <a:schemeClr val="accent1">
+                <a:shade val="50000"/>
+              </a:schemeClr>
+            </a:lnRef>
+            <a:fillRef idx="1">
+              <a:schemeClr val="accent1"/>
+            </a:fillRef>
+            <a:effectRef idx="0">
+              <a:schemeClr val="accent1"/>
+            </a:effectRef>
+            <a:fontRef idx="minor">
+              <a:schemeClr val="lt1"/>
+            </a:fontRef>
+          </p:style>
+          <p:txBody>
+            <a:bodyPr rtlCol="0" anchor="ctr"/>
+            <a:lstStyle/>
+            <a:p>
+              <a:pPr algn="ctr"/>
+              <a:r>
+                <a:rPr lang="en-IL" sz="1200" dirty="0"/>
+                <a:t>bar</a:t>
+              </a:r>
+            </a:p>
+          </p:txBody>
+        </p:sp>
+        <p:cxnSp>
+          <p:nvCxnSpPr>
+            <p:cNvPr id="28" name="Curved Connector 27">
+              <a:extLst>
+                <a:ext uri="{FF2B5EF4-FFF2-40B4-BE49-F238E27FC236}">
+                  <a16:creationId xmlns:a16="http://schemas.microsoft.com/office/drawing/2014/main" id="{32A06701-1A22-A5A7-8D5F-0BCBE3D9DAC1}"/>
+                </a:ext>
+              </a:extLst>
+            </p:cNvPr>
+            <p:cNvCxnSpPr>
+              <a:stCxn id="20" idx="1"/>
+              <a:endCxn id="19" idx="1"/>
+            </p:cNvCxnSpPr>
+            <p:nvPr/>
+          </p:nvCxnSpPr>
+          <p:spPr>
+            <a:xfrm rot="10800000">
+              <a:off x="4074160" y="4862765"/>
+              <a:ext cx="12700" cy="435361"/>
+            </a:xfrm>
+            <a:prstGeom prst="curvedConnector3">
+              <a:avLst>
+                <a:gd name="adj1" fmla="val 1800000"/>
+              </a:avLst>
+            </a:prstGeom>
+            <a:ln>
+              <a:tailEnd type="triangle"/>
+            </a:ln>
+          </p:spPr>
+          <p:style>
+            <a:lnRef idx="1">
+              <a:schemeClr val="accent1"/>
+            </a:lnRef>
+            <a:fillRef idx="0">
+              <a:schemeClr val="accent1"/>
+            </a:fillRef>
+            <a:effectRef idx="0">
+              <a:schemeClr val="accent1"/>
+            </a:effectRef>
+            <a:fontRef idx="minor">
+              <a:schemeClr val="tx1"/>
+            </a:fontRef>
+          </p:style>
+        </p:cxnSp>
+        <p:cxnSp>
+          <p:nvCxnSpPr>
+            <p:cNvPr id="30" name="Curved Connector 29">
+              <a:extLst>
+                <a:ext uri="{FF2B5EF4-FFF2-40B4-BE49-F238E27FC236}">
+                  <a16:creationId xmlns:a16="http://schemas.microsoft.com/office/drawing/2014/main" id="{F115F44A-B785-B8BD-A0A7-F49D395F38F4}"/>
+                </a:ext>
+              </a:extLst>
+            </p:cNvPr>
+            <p:cNvCxnSpPr>
+              <a:stCxn id="19" idx="1"/>
+              <a:endCxn id="18" idx="1"/>
+            </p:cNvCxnSpPr>
+            <p:nvPr/>
+          </p:nvCxnSpPr>
+          <p:spPr>
+            <a:xfrm rot="10800000">
+              <a:off x="4074160" y="4427404"/>
+              <a:ext cx="12700" cy="435361"/>
+            </a:xfrm>
+            <a:prstGeom prst="curvedConnector3">
+              <a:avLst>
+                <a:gd name="adj1" fmla="val 1800000"/>
+              </a:avLst>
+            </a:prstGeom>
+            <a:ln>
+              <a:tailEnd type="triangle"/>
+            </a:ln>
+          </p:spPr>
+          <p:style>
+            <a:lnRef idx="1">
+              <a:schemeClr val="accent1"/>
+            </a:lnRef>
+            <a:fillRef idx="0">
+              <a:schemeClr val="accent1"/>
+            </a:fillRef>
+            <a:effectRef idx="0">
+              <a:schemeClr val="accent1"/>
+            </a:effectRef>
+            <a:fontRef idx="minor">
+              <a:schemeClr val="tx1"/>
+            </a:fontRef>
+          </p:style>
+        </p:cxnSp>
+        <p:cxnSp>
+          <p:nvCxnSpPr>
+            <p:cNvPr id="32" name="Curved Connector 31">
+              <a:extLst>
+                <a:ext uri="{FF2B5EF4-FFF2-40B4-BE49-F238E27FC236}">
+                  <a16:creationId xmlns:a16="http://schemas.microsoft.com/office/drawing/2014/main" id="{3B9FCE01-41C0-B474-A7A0-3CB67802170A}"/>
+                </a:ext>
+              </a:extLst>
+            </p:cNvPr>
+            <p:cNvCxnSpPr>
+              <a:stCxn id="18" idx="1"/>
+              <a:endCxn id="17" idx="1"/>
+            </p:cNvCxnSpPr>
+            <p:nvPr/>
+          </p:nvCxnSpPr>
+          <p:spPr>
+            <a:xfrm rot="10800000">
+              <a:off x="4074160" y="3992043"/>
+              <a:ext cx="12700" cy="435361"/>
+            </a:xfrm>
+            <a:prstGeom prst="curvedConnector3">
+              <a:avLst>
+                <a:gd name="adj1" fmla="val 1800000"/>
+              </a:avLst>
+            </a:prstGeom>
+            <a:ln>
+              <a:tailEnd type="triangle"/>
+            </a:ln>
+          </p:spPr>
+          <p:style>
+            <a:lnRef idx="1">
+              <a:schemeClr val="accent1"/>
+            </a:lnRef>
+            <a:fillRef idx="0">
+              <a:schemeClr val="accent1"/>
+            </a:fillRef>
+            <a:effectRef idx="0">
+              <a:schemeClr val="accent1"/>
+            </a:effectRef>
+            <a:fontRef idx="minor">
+              <a:schemeClr val="tx1"/>
+            </a:fontRef>
+          </p:style>
+        </p:cxnSp>
+        <p:cxnSp>
+          <p:nvCxnSpPr>
+            <p:cNvPr id="34" name="Curved Connector 33">
+              <a:extLst>
+                <a:ext uri="{FF2B5EF4-FFF2-40B4-BE49-F238E27FC236}">
+                  <a16:creationId xmlns:a16="http://schemas.microsoft.com/office/drawing/2014/main" id="{36EDE585-81E7-6A94-63DD-AF534975ED6D}"/>
+                </a:ext>
+              </a:extLst>
+            </p:cNvPr>
+            <p:cNvCxnSpPr>
+              <a:stCxn id="17" idx="1"/>
+              <a:endCxn id="16" idx="1"/>
+            </p:cNvCxnSpPr>
+            <p:nvPr/>
+          </p:nvCxnSpPr>
+          <p:spPr>
+            <a:xfrm rot="10800000">
+              <a:off x="4074160" y="3556682"/>
+              <a:ext cx="12700" cy="435361"/>
+            </a:xfrm>
+            <a:prstGeom prst="curvedConnector3">
+              <a:avLst>
+                <a:gd name="adj1" fmla="val 1800000"/>
+              </a:avLst>
+            </a:prstGeom>
+            <a:ln>
+              <a:tailEnd type="triangle"/>
+            </a:ln>
+          </p:spPr>
+          <p:style>
+            <a:lnRef idx="1">
+              <a:schemeClr val="accent1"/>
+            </a:lnRef>
+            <a:fillRef idx="0">
+              <a:schemeClr val="accent1"/>
+            </a:fillRef>
+            <a:effectRef idx="0">
+              <a:schemeClr val="accent1"/>
+            </a:effectRef>
+            <a:fontRef idx="minor">
+              <a:schemeClr val="tx1"/>
+            </a:fontRef>
+          </p:style>
+        </p:cxnSp>
+        <p:cxnSp>
+          <p:nvCxnSpPr>
+            <p:cNvPr id="36" name="Curved Connector 35">
+              <a:extLst>
+                <a:ext uri="{FF2B5EF4-FFF2-40B4-BE49-F238E27FC236}">
+                  <a16:creationId xmlns:a16="http://schemas.microsoft.com/office/drawing/2014/main" id="{80ABB3B9-77FE-8461-2732-76D0BEE21AF6}"/>
+                </a:ext>
+              </a:extLst>
+            </p:cNvPr>
+            <p:cNvCxnSpPr>
+              <a:stCxn id="16" idx="1"/>
+              <a:endCxn id="15" idx="1"/>
+            </p:cNvCxnSpPr>
+            <p:nvPr/>
+          </p:nvCxnSpPr>
+          <p:spPr>
+            <a:xfrm rot="10800000">
+              <a:off x="4074160" y="3121321"/>
+              <a:ext cx="12700" cy="435361"/>
+            </a:xfrm>
+            <a:prstGeom prst="curvedConnector3">
+              <a:avLst>
+                <a:gd name="adj1" fmla="val 1800000"/>
+              </a:avLst>
+            </a:prstGeom>
+            <a:ln>
+              <a:tailEnd type="triangle"/>
+            </a:ln>
+          </p:spPr>
+          <p:style>
+            <a:lnRef idx="1">
+              <a:schemeClr val="accent1"/>
+            </a:lnRef>
+            <a:fillRef idx="0">
+              <a:schemeClr val="accent1"/>
+            </a:fillRef>
+            <a:effectRef idx="0">
+              <a:schemeClr val="accent1"/>
+            </a:effectRef>
+            <a:fontRef idx="minor">
+              <a:schemeClr val="tx1"/>
+            </a:fontRef>
+          </p:style>
+        </p:cxnSp>
+        <p:cxnSp>
+          <p:nvCxnSpPr>
+            <p:cNvPr id="38" name="Curved Connector 37">
+              <a:extLst>
+                <a:ext uri="{FF2B5EF4-FFF2-40B4-BE49-F238E27FC236}">
+                  <a16:creationId xmlns:a16="http://schemas.microsoft.com/office/drawing/2014/main" id="{C947ED6C-07DF-6F1B-9F4F-FE243D5E1721}"/>
+                </a:ext>
+              </a:extLst>
+            </p:cNvPr>
+            <p:cNvCxnSpPr>
+              <a:stCxn id="20" idx="3"/>
+              <a:endCxn id="19" idx="3"/>
+            </p:cNvCxnSpPr>
+            <p:nvPr/>
+          </p:nvCxnSpPr>
+          <p:spPr>
+            <a:xfrm flipV="1">
+              <a:off x="5154160" y="4862764"/>
+              <a:ext cx="12700" cy="435361"/>
+            </a:xfrm>
+            <a:prstGeom prst="curvedConnector3">
+              <a:avLst>
+                <a:gd name="adj1" fmla="val 1800000"/>
+              </a:avLst>
+            </a:prstGeom>
+            <a:ln>
+              <a:tailEnd type="triangle"/>
+            </a:ln>
+          </p:spPr>
+          <p:style>
+            <a:lnRef idx="1">
+              <a:schemeClr val="accent1"/>
+            </a:lnRef>
+            <a:fillRef idx="0">
+              <a:schemeClr val="accent1"/>
+            </a:fillRef>
+            <a:effectRef idx="0">
+              <a:schemeClr val="accent1"/>
+            </a:effectRef>
+            <a:fontRef idx="minor">
+              <a:schemeClr val="tx1"/>
+            </a:fontRef>
+          </p:style>
+        </p:cxnSp>
+        <p:cxnSp>
+          <p:nvCxnSpPr>
+            <p:cNvPr id="40" name="Curved Connector 39">
+              <a:extLst>
+                <a:ext uri="{FF2B5EF4-FFF2-40B4-BE49-F238E27FC236}">
+                  <a16:creationId xmlns:a16="http://schemas.microsoft.com/office/drawing/2014/main" id="{0839B740-29F1-0F05-1A57-C1DD1C3C8C0A}"/>
+                </a:ext>
+              </a:extLst>
+            </p:cNvPr>
+            <p:cNvCxnSpPr>
+              <a:stCxn id="19" idx="3"/>
+              <a:endCxn id="18" idx="3"/>
+            </p:cNvCxnSpPr>
+            <p:nvPr/>
+          </p:nvCxnSpPr>
+          <p:spPr>
+            <a:xfrm flipV="1">
+              <a:off x="5154160" y="4427403"/>
+              <a:ext cx="12700" cy="435361"/>
+            </a:xfrm>
+            <a:prstGeom prst="curvedConnector3">
+              <a:avLst>
+                <a:gd name="adj1" fmla="val 1800000"/>
+              </a:avLst>
+            </a:prstGeom>
+            <a:ln>
+              <a:tailEnd type="triangle"/>
+            </a:ln>
+          </p:spPr>
+          <p:style>
+            <a:lnRef idx="1">
+              <a:schemeClr val="accent1"/>
+            </a:lnRef>
+            <a:fillRef idx="0">
+              <a:schemeClr val="accent1"/>
+            </a:fillRef>
+            <a:effectRef idx="0">
+              <a:schemeClr val="accent1"/>
+            </a:effectRef>
+            <a:fontRef idx="minor">
+              <a:schemeClr val="tx1"/>
+            </a:fontRef>
+          </p:style>
+        </p:cxnSp>
+        <p:cxnSp>
+          <p:nvCxnSpPr>
+            <p:cNvPr id="42" name="Curved Connector 41">
+              <a:extLst>
+                <a:ext uri="{FF2B5EF4-FFF2-40B4-BE49-F238E27FC236}">
+                  <a16:creationId xmlns:a16="http://schemas.microsoft.com/office/drawing/2014/main" id="{C6BDB1D6-A41F-735D-5401-ED4B32D7AABE}"/>
+                </a:ext>
+              </a:extLst>
+            </p:cNvPr>
+            <p:cNvCxnSpPr>
+              <a:stCxn id="18" idx="3"/>
+              <a:endCxn id="15" idx="3"/>
+            </p:cNvCxnSpPr>
+            <p:nvPr/>
+          </p:nvCxnSpPr>
+          <p:spPr>
+            <a:xfrm flipV="1">
+              <a:off x="5154160" y="3121320"/>
+              <a:ext cx="12700" cy="1306083"/>
+            </a:xfrm>
+            <a:prstGeom prst="curvedConnector3">
+              <a:avLst>
+                <a:gd name="adj1" fmla="val 1800000"/>
+              </a:avLst>
+            </a:prstGeom>
+            <a:ln>
+              <a:tailEnd type="triangle"/>
+            </a:ln>
+          </p:spPr>
+          <p:style>
+            <a:lnRef idx="1">
+              <a:schemeClr val="accent1"/>
+            </a:lnRef>
+            <a:fillRef idx="0">
+              <a:schemeClr val="accent1"/>
+            </a:fillRef>
+            <a:effectRef idx="0">
+              <a:schemeClr val="accent1"/>
+            </a:effectRef>
+            <a:fontRef idx="minor">
+              <a:schemeClr val="tx1"/>
+            </a:fontRef>
+          </p:style>
+        </p:cxnSp>
+        <p:cxnSp>
+          <p:nvCxnSpPr>
+            <p:cNvPr id="44" name="Curved Connector 43">
+              <a:extLst>
+                <a:ext uri="{FF2B5EF4-FFF2-40B4-BE49-F238E27FC236}">
+                  <a16:creationId xmlns:a16="http://schemas.microsoft.com/office/drawing/2014/main" id="{45D51C23-952C-68F1-AEA7-380EBBC60349}"/>
+                </a:ext>
+              </a:extLst>
+            </p:cNvPr>
+            <p:cNvCxnSpPr>
+              <a:stCxn id="16" idx="3"/>
+              <a:endCxn id="15" idx="3"/>
+            </p:cNvCxnSpPr>
+            <p:nvPr/>
+          </p:nvCxnSpPr>
+          <p:spPr>
+            <a:xfrm flipV="1">
+              <a:off x="5154160" y="3121320"/>
+              <a:ext cx="12700" cy="435361"/>
+            </a:xfrm>
+            <a:prstGeom prst="curvedConnector3">
+              <a:avLst>
+                <a:gd name="adj1" fmla="val 1800000"/>
+              </a:avLst>
+            </a:prstGeom>
+            <a:ln>
+              <a:tailEnd type="triangle"/>
+            </a:ln>
+          </p:spPr>
+          <p:style>
+            <a:lnRef idx="1">
+              <a:schemeClr val="accent1"/>
+            </a:lnRef>
+            <a:fillRef idx="0">
+              <a:schemeClr val="accent1"/>
+            </a:fillRef>
+            <a:effectRef idx="0">
+              <a:schemeClr val="accent1"/>
+            </a:effectRef>
+            <a:fontRef idx="minor">
+              <a:schemeClr val="tx1"/>
+            </a:fontRef>
+          </p:style>
+        </p:cxnSp>
+        <p:cxnSp>
+          <p:nvCxnSpPr>
+            <p:cNvPr id="46" name="Curved Connector 45">
+              <a:extLst>
+                <a:ext uri="{FF2B5EF4-FFF2-40B4-BE49-F238E27FC236}">
+                  <a16:creationId xmlns:a16="http://schemas.microsoft.com/office/drawing/2014/main" id="{9812B797-7064-F76A-435F-77665AE11758}"/>
+                </a:ext>
+              </a:extLst>
+            </p:cNvPr>
+            <p:cNvCxnSpPr>
+              <a:cxnSpLocks/>
+              <a:stCxn id="17" idx="3"/>
+              <a:endCxn id="15" idx="3"/>
+            </p:cNvCxnSpPr>
+            <p:nvPr/>
+          </p:nvCxnSpPr>
+          <p:spPr>
+            <a:xfrm flipV="1">
+              <a:off x="5154160" y="3121320"/>
+              <a:ext cx="12700" cy="870722"/>
+            </a:xfrm>
+            <a:prstGeom prst="curvedConnector3">
+              <a:avLst>
+                <a:gd name="adj1" fmla="val 1800000"/>
+              </a:avLst>
+            </a:prstGeom>
+            <a:ln>
+              <a:tailEnd type="triangle"/>
+            </a:ln>
+          </p:spPr>
+          <p:style>
+            <a:lnRef idx="1">
+              <a:schemeClr val="accent1"/>
+            </a:lnRef>
+            <a:fillRef idx="0">
+              <a:schemeClr val="accent1"/>
+            </a:fillRef>
+            <a:effectRef idx="0">
+              <a:schemeClr val="accent1"/>
+            </a:effectRef>
+            <a:fontRef idx="minor">
+              <a:schemeClr val="tx1"/>
+            </a:fontRef>
+          </p:style>
+        </p:cxnSp>
+      </p:grpSp>
+    </p:spTree>
+    <p:extLst>
+      <p:ext uri="{BB962C8B-B14F-4D97-AF65-F5344CB8AC3E}">
+        <p14:creationId xmlns:p14="http://schemas.microsoft.com/office/powerpoint/2010/main" val="88571511"/>
+      </p:ext>
+    </p:extLst>
+  </p:cSld>
+  <p:clrMapOvr>
+    <a:masterClrMapping/>
+  </p:clrMapOvr>
+</p:sld>
+</file>
+
+<file path=ppt/slides/slide6.xml><?xml version="1.0" encoding="utf-8"?>
+<p:sld xmlns:a="http://schemas.openxmlformats.org/drawingml/2006/main" xmlns:r="http://schemas.openxmlformats.org/officeDocument/2006/relationships" xmlns:p="http://schemas.openxmlformats.org/presentationml/2006/main">
+  <p:cSld>
+    <p:spTree>
+      <p:nvGrpSpPr>
+        <p:cNvPr id="1" name=""/>
+        <p:cNvGrpSpPr/>
+        <p:nvPr/>
+      </p:nvGrpSpPr>
+      <p:grpSpPr>
+        <a:xfrm>
+          <a:off x="0" y="0"/>
+          <a:ext cx="0" cy="0"/>
+          <a:chOff x="0" y="0"/>
+          <a:chExt cx="0" cy="0"/>
+        </a:xfrm>
+      </p:grpSpPr>
+    </p:spTree>
+    <p:extLst>
+      <p:ext uri="{BB962C8B-B14F-4D97-AF65-F5344CB8AC3E}">
+        <p14:creationId xmlns:p14="http://schemas.microsoft.com/office/powerpoint/2010/main" val="466821050"/>
       </p:ext>
     </p:extLst>
   </p:cSld>

</xml_diff>